<commit_message>
Update the MSOrganiser Summary
</commit_message>
<xml_diff>
--- a/docs/MSOrganiser_Summary.pptx
+++ b/docs/MSOrganiser_Summary.pptx
@@ -5,10 +5,11 @@
     <p:sldMasterId id="2147483648" r:id="rId1"/>
   </p:sldMasterIdLst>
   <p:notesMasterIdLst>
-    <p:notesMasterId r:id="rId3"/>
+    <p:notesMasterId r:id="rId4"/>
   </p:notesMasterIdLst>
   <p:sldIdLst>
     <p:sldId id="256" r:id="rId2"/>
+    <p:sldId id="257" r:id="rId3"/>
   </p:sldIdLst>
   <p:sldSz cx="13970000" cy="10795000"/>
   <p:notesSz cx="6858000" cy="9144000"/>
@@ -2140,7 +2141,7 @@
           </a:ln>
           <a:extLst>
             <a:ext uri="{C572A759-6A51-4108-AA02-DFA0A04FC94B}">
-              <ma14:wrappingTextBoxFlag xmlns="" xmlns:ma14="http://schemas.microsoft.com/office/mac/drawingml/2011/main" val="1"/>
+              <ma14:wrappingTextBoxFlag xmlns:ma14="http://schemas.microsoft.com/office/mac/drawingml/2011/main" xmlns="" val="1"/>
             </a:ext>
           </a:extLst>
         </p:spPr>
@@ -2179,7 +2180,7 @@
           </a:ln>
           <a:extLst>
             <a:ext uri="{C572A759-6A51-4108-AA02-DFA0A04FC94B}">
-              <ma14:wrappingTextBoxFlag xmlns="" xmlns:ma14="http://schemas.microsoft.com/office/mac/drawingml/2011/main" val="1"/>
+              <ma14:wrappingTextBoxFlag xmlns:ma14="http://schemas.microsoft.com/office/mac/drawingml/2011/main" xmlns="" val="1"/>
             </a:ext>
           </a:extLst>
         </p:spPr>
@@ -3117,7 +3118,7 @@
           </a:ln>
           <a:extLst>
             <a:ext uri="{C572A759-6A51-4108-AA02-DFA0A04FC94B}">
-              <ma14:wrappingTextBoxFlag xmlns="" xmlns:ma14="http://schemas.microsoft.com/office/mac/drawingml/2011/main" val="1"/>
+              <ma14:wrappingTextBoxFlag xmlns:ma14="http://schemas.microsoft.com/office/mac/drawingml/2011/main" xmlns="" val="1"/>
             </a:ext>
           </a:extLst>
         </p:spPr>
@@ -3244,7 +3245,7 @@
           </a:ln>
           <a:extLst>
             <a:ext uri="{C572A759-6A51-4108-AA02-DFA0A04FC94B}">
-              <ma14:wrappingTextBoxFlag xmlns="" xmlns:ma14="http://schemas.microsoft.com/office/mac/drawingml/2011/main" val="1"/>
+              <ma14:wrappingTextBoxFlag xmlns:ma14="http://schemas.microsoft.com/office/mac/drawingml/2011/main" xmlns="" val="1"/>
             </a:ext>
           </a:extLst>
         </p:spPr>
@@ -3269,11 +3270,11 @@
             </a:pPr>
             <a:r>
               <a:rPr dirty="0"/>
-              <a:t>Updated: 201</a:t>
+              <a:t>Updated: 20</a:t>
             </a:r>
             <a:r>
               <a:rPr lang="en-SG" dirty="0"/>
-              <a:t>8</a:t>
+              <a:t>21</a:t>
             </a:r>
             <a:r>
               <a:rPr dirty="0"/>
@@ -3281,7 +3282,7 @@
             </a:r>
             <a:r>
               <a:rPr lang="en-SG" dirty="0"/>
-              <a:t>9</a:t>
+              <a:t>5</a:t>
             </a:r>
             <a:endParaRPr dirty="0"/>
           </a:p>
@@ -3348,7 +3349,7 @@
           </a:ln>
           <a:extLst>
             <a:ext uri="{C572A759-6A51-4108-AA02-DFA0A04FC94B}">
-              <ma14:wrappingTextBoxFlag xmlns="" xmlns:ma14="http://schemas.microsoft.com/office/mac/drawingml/2011/main" val="1"/>
+              <ma14:wrappingTextBoxFlag xmlns:ma14="http://schemas.microsoft.com/office/mac/drawingml/2011/main" xmlns="" val="1"/>
             </a:ext>
           </a:extLst>
         </p:spPr>
@@ -3440,7 +3441,7 @@
           </a:ln>
           <a:extLst>
             <a:ext uri="{C572A759-6A51-4108-AA02-DFA0A04FC94B}">
-              <ma14:wrappingTextBoxFlag xmlns="" xmlns:ma14="http://schemas.microsoft.com/office/mac/drawingml/2011/main" val="1"/>
+              <ma14:wrappingTextBoxFlag xmlns:ma14="http://schemas.microsoft.com/office/mac/drawingml/2011/main" xmlns="" val="1"/>
             </a:ext>
           </a:extLst>
         </p:spPr>
@@ -3478,7 +3479,7 @@
           </a:ln>
           <a:extLst>
             <a:ext uri="{C572A759-6A51-4108-AA02-DFA0A04FC94B}">
-              <ma14:wrappingTextBoxFlag xmlns="" xmlns:ma14="http://schemas.microsoft.com/office/mac/drawingml/2011/main" val="1"/>
+              <ma14:wrappingTextBoxFlag xmlns:ma14="http://schemas.microsoft.com/office/mac/drawingml/2011/main" xmlns="" val="1"/>
             </a:ext>
           </a:extLst>
         </p:spPr>
@@ -3514,7 +3515,7 @@
             </a:pPr>
             <a:r>
               <a:rPr lang="en-SG" dirty="0">
-                <a:latin typeface="Source Sans Pro"/>
+                <a:latin typeface="+mj-lt"/>
                 <a:ea typeface="Source Sans Pro"/>
                 <a:cs typeface="Source Sans Pro"/>
                 <a:sym typeface="Source Sans Pro"/>
@@ -3522,7 +3523,7 @@
               <a:t>Refer to the summary sheet or user manual to see how it is used.</a:t>
             </a:r>
             <a:endParaRPr dirty="0">
-              <a:latin typeface="Source Sans Pro"/>
+              <a:latin typeface="+mj-lt"/>
               <a:ea typeface="Source Sans Pro"/>
               <a:cs typeface="Source Sans Pro"/>
               <a:sym typeface="Source Sans Pro"/>
@@ -4439,7 +4440,7 @@
           </a:ln>
           <a:extLst>
             <a:ext uri="{C572A759-6A51-4108-AA02-DFA0A04FC94B}">
-              <ma14:wrappingTextBoxFlag xmlns="" xmlns:ma14="http://schemas.microsoft.com/office/mac/drawingml/2011/main" val="1"/>
+              <ma14:wrappingTextBoxFlag xmlns:ma14="http://schemas.microsoft.com/office/mac/drawingml/2011/main" xmlns="" val="1"/>
             </a:ext>
           </a:extLst>
         </p:spPr>
@@ -4477,7 +4478,7 @@
           </a:ln>
           <a:extLst>
             <a:ext uri="{C572A759-6A51-4108-AA02-DFA0A04FC94B}">
-              <ma14:wrappingTextBoxFlag xmlns="" xmlns:ma14="http://schemas.microsoft.com/office/mac/drawingml/2011/main" val="1"/>
+              <ma14:wrappingTextBoxFlag xmlns:ma14="http://schemas.microsoft.com/office/mac/drawingml/2011/main" xmlns="" val="1"/>
             </a:ext>
           </a:extLst>
         </p:spPr>
@@ -4516,8 +4517,8 @@
         </p:nvSpPr>
         <p:spPr>
           <a:xfrm flipV="1">
-            <a:off x="5028054" y="1038183"/>
-            <a:ext cx="7905467" cy="2535"/>
+            <a:off x="5028054" y="1014690"/>
+            <a:ext cx="8741096" cy="26027"/>
           </a:xfrm>
           <a:prstGeom prst="line">
             <a:avLst/>
@@ -4591,7 +4592,7 @@
           </a:ln>
           <a:extLst>
             <a:ext uri="{C572A759-6A51-4108-AA02-DFA0A04FC94B}">
-              <ma14:wrappingTextBoxFlag xmlns="" xmlns:ma14="http://schemas.microsoft.com/office/mac/drawingml/2011/main" val="1"/>
+              <ma14:wrappingTextBoxFlag xmlns:ma14="http://schemas.microsoft.com/office/mac/drawingml/2011/main" xmlns="" val="1"/>
             </a:ext>
           </a:extLst>
         </p:spPr>
@@ -4629,7 +4630,7 @@
           </a:ln>
           <a:extLst>
             <a:ext uri="{C572A759-6A51-4108-AA02-DFA0A04FC94B}">
-              <ma14:wrappingTextBoxFlag xmlns="" xmlns:ma14="http://schemas.microsoft.com/office/mac/drawingml/2011/main" val="1"/>
+              <ma14:wrappingTextBoxFlag xmlns:ma14="http://schemas.microsoft.com/office/mac/drawingml/2011/main" xmlns="" val="1"/>
             </a:ext>
           </a:extLst>
         </p:spPr>
@@ -4733,9 +4734,85 @@
           </a:prstGeom>
         </p:spPr>
       </p:pic>
+      <p:sp>
+        <p:nvSpPr>
+          <p:cNvPr id="33" name="CODE"/>
+          <p:cNvSpPr txBox="1"/>
+          <p:nvPr/>
+        </p:nvSpPr>
+        <p:spPr>
+          <a:xfrm>
+            <a:off x="5124488" y="4732172"/>
+            <a:ext cx="1912383" cy="210314"/>
+          </a:xfrm>
+          <a:prstGeom prst="rect">
+            <a:avLst/>
+          </a:prstGeom>
+          <a:ln w="12700">
+            <a:miter lim="400000"/>
+          </a:ln>
+          <a:extLst>
+            <a:ext uri="{C572A759-6A51-4108-AA02-DFA0A04FC94B}">
+              <ma14:wrappingTextBoxFlag xmlns:ma14="http://schemas.microsoft.com/office/mac/drawingml/2011/main" xmlns="" val="1"/>
+            </a:ext>
+          </a:extLst>
+        </p:spPr>
+        <p:txBody>
+          <a:bodyPr wrap="none" lIns="12700" tIns="12700" rIns="12700" bIns="12700" anchor="ctr">
+            <a:spAutoFit/>
+          </a:bodyPr>
+          <a:lstStyle/>
+          <a:p>
+            <a:pPr lvl="1" indent="0"/>
+            <a:r>
+              <a:rPr lang="en-SG" dirty="0"/>
+              <a:t>2. Choose Output options</a:t>
+            </a:r>
+            <a:endParaRPr dirty="0"/>
+          </a:p>
+        </p:txBody>
+      </p:sp>
+      <p:sp>
+        <p:nvSpPr>
+          <p:cNvPr id="34" name="CODE"/>
+          <p:cNvSpPr txBox="1"/>
+          <p:nvPr/>
+        </p:nvSpPr>
+        <p:spPr>
+          <a:xfrm>
+            <a:off x="9334388" y="1495124"/>
+            <a:ext cx="2172069" cy="210314"/>
+          </a:xfrm>
+          <a:prstGeom prst="rect">
+            <a:avLst/>
+          </a:prstGeom>
+          <a:ln w="12700">
+            <a:miter lim="400000"/>
+          </a:ln>
+          <a:extLst>
+            <a:ext uri="{C572A759-6A51-4108-AA02-DFA0A04FC94B}">
+              <ma14:wrappingTextBoxFlag xmlns:ma14="http://schemas.microsoft.com/office/mac/drawingml/2011/main" xmlns="" val="1"/>
+            </a:ext>
+          </a:extLst>
+        </p:spPr>
+        <p:txBody>
+          <a:bodyPr wrap="none" lIns="12700" tIns="12700" rIns="12700" bIns="12700" anchor="ctr">
+            <a:spAutoFit/>
+          </a:bodyPr>
+          <a:lstStyle/>
+          <a:p>
+            <a:pPr lvl="1" indent="0"/>
+            <a:r>
+              <a:rPr lang="en-SG" dirty="0"/>
+              <a:t>3. Click start to organise data</a:t>
+            </a:r>
+            <a:endParaRPr dirty="0"/>
+          </a:p>
+        </p:txBody>
+      </p:sp>
       <p:pic>
         <p:nvPicPr>
-          <p:cNvPr id="5" name="Picture 4"/>
+          <p:cNvPr id="6" name="Picture 5"/>
           <p:cNvPicPr>
             <a:picLocks noChangeAspect="1"/>
           </p:cNvPicPr>
@@ -4749,93 +4826,17 @@
         </p:blipFill>
         <p:spPr>
           <a:xfrm>
-            <a:off x="9586060" y="2628042"/>
-            <a:ext cx="3347461" cy="1297234"/>
+            <a:off x="9586060" y="1767120"/>
+            <a:ext cx="933450" cy="371475"/>
           </a:xfrm>
           <a:prstGeom prst="rect">
             <a:avLst/>
           </a:prstGeom>
         </p:spPr>
       </p:pic>
-      <p:sp>
-        <p:nvSpPr>
-          <p:cNvPr id="33" name="CODE"/>
-          <p:cNvSpPr txBox="1"/>
-          <p:nvPr/>
-        </p:nvSpPr>
-        <p:spPr>
-          <a:xfrm>
-            <a:off x="5124488" y="4732172"/>
-            <a:ext cx="1912383" cy="210314"/>
-          </a:xfrm>
-          <a:prstGeom prst="rect">
-            <a:avLst/>
-          </a:prstGeom>
-          <a:ln w="12700">
-            <a:miter lim="400000"/>
-          </a:ln>
-          <a:extLst>
-            <a:ext uri="{C572A759-6A51-4108-AA02-DFA0A04FC94B}">
-              <ma14:wrappingTextBoxFlag xmlns="" xmlns:ma14="http://schemas.microsoft.com/office/mac/drawingml/2011/main" val="1"/>
-            </a:ext>
-          </a:extLst>
-        </p:spPr>
-        <p:txBody>
-          <a:bodyPr wrap="none" lIns="12700" tIns="12700" rIns="12700" bIns="12700" anchor="ctr">
-            <a:spAutoFit/>
-          </a:bodyPr>
-          <a:lstStyle/>
-          <a:p>
-            <a:pPr lvl="1" indent="0"/>
-            <a:r>
-              <a:rPr lang="en-SG" dirty="0"/>
-              <a:t>2. Choose Output options</a:t>
-            </a:r>
-            <a:endParaRPr dirty="0"/>
-          </a:p>
-        </p:txBody>
-      </p:sp>
-      <p:sp>
-        <p:nvSpPr>
-          <p:cNvPr id="34" name="CODE"/>
-          <p:cNvSpPr txBox="1"/>
-          <p:nvPr/>
-        </p:nvSpPr>
-        <p:spPr>
-          <a:xfrm>
-            <a:off x="9334388" y="1495124"/>
-            <a:ext cx="2172069" cy="210314"/>
-          </a:xfrm>
-          <a:prstGeom prst="rect">
-            <a:avLst/>
-          </a:prstGeom>
-          <a:ln w="12700">
-            <a:miter lim="400000"/>
-          </a:ln>
-          <a:extLst>
-            <a:ext uri="{C572A759-6A51-4108-AA02-DFA0A04FC94B}">
-              <ma14:wrappingTextBoxFlag xmlns="" xmlns:ma14="http://schemas.microsoft.com/office/mac/drawingml/2011/main" val="1"/>
-            </a:ext>
-          </a:extLst>
-        </p:spPr>
-        <p:txBody>
-          <a:bodyPr wrap="none" lIns="12700" tIns="12700" rIns="12700" bIns="12700" anchor="ctr">
-            <a:spAutoFit/>
-          </a:bodyPr>
-          <a:lstStyle/>
-          <a:p>
-            <a:pPr lvl="1" indent="0"/>
-            <a:r>
-              <a:rPr lang="en-SG" dirty="0"/>
-              <a:t>3. Click start to organise data</a:t>
-            </a:r>
-            <a:endParaRPr dirty="0"/>
-          </a:p>
-        </p:txBody>
-      </p:sp>
       <p:pic>
         <p:nvPicPr>
-          <p:cNvPr id="6" name="Picture 5"/>
+          <p:cNvPr id="7" name="Picture 6"/>
           <p:cNvPicPr>
             <a:picLocks noChangeAspect="1"/>
           </p:cNvPicPr>
@@ -4849,30 +4850,6 @@
         </p:blipFill>
         <p:spPr>
           <a:xfrm>
-            <a:off x="9586060" y="1767120"/>
-            <a:ext cx="933450" cy="371475"/>
-          </a:xfrm>
-          <a:prstGeom prst="rect">
-            <a:avLst/>
-          </a:prstGeom>
-        </p:spPr>
-      </p:pic>
-      <p:pic>
-        <p:nvPicPr>
-          <p:cNvPr id="7" name="Picture 6"/>
-          <p:cNvPicPr>
-            <a:picLocks noChangeAspect="1"/>
-          </p:cNvPicPr>
-          <p:nvPr/>
-        </p:nvPicPr>
-        <p:blipFill>
-          <a:blip r:embed="rId9"/>
-          <a:stretch>
-            <a:fillRect/>
-          </a:stretch>
-        </p:blipFill>
-        <p:spPr>
-          <a:xfrm>
             <a:off x="744233" y="6838641"/>
             <a:ext cx="3391729" cy="707839"/>
           </a:xfrm>
@@ -4900,7 +4877,7 @@
           </a:ln>
           <a:extLst>
             <a:ext uri="{C572A759-6A51-4108-AA02-DFA0A04FC94B}">
-              <ma14:wrappingTextBoxFlag xmlns="" xmlns:ma14="http://schemas.microsoft.com/office/mac/drawingml/2011/main" val="1"/>
+              <ma14:wrappingTextBoxFlag xmlns:ma14="http://schemas.microsoft.com/office/mac/drawingml/2011/main" xmlns="" val="1"/>
             </a:ext>
           </a:extLst>
         </p:spPr>
@@ -5014,7 +4991,7 @@
           <p:nvPr/>
         </p:nvPicPr>
         <p:blipFill>
-          <a:blip r:embed="rId10"/>
+          <a:blip r:embed="rId9"/>
           <a:stretch>
             <a:fillRect/>
           </a:stretch>
@@ -5095,7 +5072,7 @@
         </p:nvSpPr>
         <p:spPr>
           <a:xfrm>
-            <a:off x="185147" y="9975153"/>
+            <a:off x="185147" y="9911653"/>
             <a:ext cx="1464359" cy="210314"/>
           </a:xfrm>
           <a:prstGeom prst="rect">
@@ -5106,7 +5083,7 @@
           </a:ln>
           <a:extLst>
             <a:ext uri="{C572A759-6A51-4108-AA02-DFA0A04FC94B}">
-              <ma14:wrappingTextBoxFlag xmlns="" xmlns:ma14="http://schemas.microsoft.com/office/mac/drawingml/2011/main" val="1"/>
+              <ma14:wrappingTextBoxFlag xmlns:ma14="http://schemas.microsoft.com/office/mac/drawingml/2011/main" xmlns="" val="1"/>
             </a:ext>
           </a:extLst>
         </p:spPr>
@@ -5133,7 +5110,7 @@
         </p:nvSpPr>
         <p:spPr>
           <a:xfrm>
-            <a:off x="196519" y="8950484"/>
+            <a:off x="196519" y="8925084"/>
             <a:ext cx="1287250" cy="210314"/>
           </a:xfrm>
           <a:prstGeom prst="rect">
@@ -5144,7 +5121,7 @@
           </a:ln>
           <a:extLst>
             <a:ext uri="{C572A759-6A51-4108-AA02-DFA0A04FC94B}">
-              <ma14:wrappingTextBoxFlag xmlns="" xmlns:ma14="http://schemas.microsoft.com/office/mac/drawingml/2011/main" val="1"/>
+              <ma14:wrappingTextBoxFlag xmlns:ma14="http://schemas.microsoft.com/office/mac/drawingml/2011/main" xmlns="" val="1"/>
             </a:ext>
           </a:extLst>
         </p:spPr>
@@ -5172,14 +5149,14 @@
           <p:nvPr/>
         </p:nvPicPr>
         <p:blipFill>
-          <a:blip r:embed="rId11"/>
+          <a:blip r:embed="rId10"/>
           <a:stretch>
             <a:fillRect/>
           </a:stretch>
         </p:blipFill>
         <p:spPr>
           <a:xfrm>
-            <a:off x="1314587" y="8191997"/>
+            <a:off x="1091300" y="8191997"/>
             <a:ext cx="2344714" cy="657451"/>
           </a:xfrm>
           <a:prstGeom prst="rect">
@@ -5196,39 +5173,15 @@
           <p:nvPr/>
         </p:nvPicPr>
         <p:blipFill>
-          <a:blip r:embed="rId12"/>
+          <a:blip r:embed="rId11"/>
           <a:stretch>
             <a:fillRect/>
           </a:stretch>
         </p:blipFill>
         <p:spPr>
           <a:xfrm>
-            <a:off x="959112" y="9241052"/>
+            <a:off x="703928" y="9241052"/>
             <a:ext cx="3167048" cy="563548"/>
-          </a:xfrm>
-          <a:prstGeom prst="rect">
-            <a:avLst/>
-          </a:prstGeom>
-        </p:spPr>
-      </p:pic>
-      <p:pic>
-        <p:nvPicPr>
-          <p:cNvPr id="12" name="Picture 11"/>
-          <p:cNvPicPr>
-            <a:picLocks noChangeAspect="1"/>
-          </p:cNvPicPr>
-          <p:nvPr/>
-        </p:nvPicPr>
-        <p:blipFill>
-          <a:blip r:embed="rId13"/>
-          <a:stretch>
-            <a:fillRect/>
-          </a:stretch>
-        </p:blipFill>
-        <p:spPr>
-          <a:xfrm>
-            <a:off x="446167" y="10312330"/>
-            <a:ext cx="4170460" cy="325589"/>
           </a:xfrm>
           <a:prstGeom prst="rect">
             <a:avLst/>
@@ -5254,7 +5207,7 @@
           </a:ln>
           <a:extLst>
             <a:ext uri="{C572A759-6A51-4108-AA02-DFA0A04FC94B}">
-              <ma14:wrappingTextBoxFlag xmlns="" xmlns:ma14="http://schemas.microsoft.com/office/mac/drawingml/2011/main" val="1"/>
+              <ma14:wrappingTextBoxFlag xmlns:ma14="http://schemas.microsoft.com/office/mac/drawingml/2011/main" xmlns="" val="1"/>
             </a:ext>
           </a:extLst>
         </p:spPr>
@@ -5294,7 +5247,7 @@
         <p:spPr>
           <a:xfrm>
             <a:off x="5079262" y="5922280"/>
-            <a:ext cx="8358064" cy="28702"/>
+            <a:ext cx="8741096" cy="47076"/>
           </a:xfrm>
           <a:prstGeom prst="line">
             <a:avLst/>
@@ -5336,15 +5289,15 @@
           <p:nvPr/>
         </p:nvPicPr>
         <p:blipFill>
-          <a:blip r:embed="rId14"/>
+          <a:blip r:embed="rId12"/>
           <a:stretch>
             <a:fillRect/>
           </a:stretch>
         </p:blipFill>
         <p:spPr>
           <a:xfrm>
-            <a:off x="5337024" y="6805371"/>
-            <a:ext cx="2628653" cy="1053293"/>
+            <a:off x="5442206" y="6731866"/>
+            <a:ext cx="2086460" cy="836038"/>
           </a:xfrm>
           <a:prstGeom prst="rect">
             <a:avLst/>
@@ -5360,15 +5313,15 @@
           <p:nvPr/>
         </p:nvPicPr>
         <p:blipFill>
-          <a:blip r:embed="rId15"/>
+          <a:blip r:embed="rId13"/>
           <a:stretch>
             <a:fillRect/>
           </a:stretch>
         </p:blipFill>
         <p:spPr>
           <a:xfrm>
-            <a:off x="9522619" y="6781168"/>
-            <a:ext cx="2687117" cy="1143652"/>
+            <a:off x="8660812" y="6843109"/>
+            <a:ext cx="1863331" cy="793044"/>
           </a:xfrm>
           <a:prstGeom prst="rect">
             <a:avLst/>
@@ -5394,7 +5347,7 @@
           </a:ln>
           <a:extLst>
             <a:ext uri="{C572A759-6A51-4108-AA02-DFA0A04FC94B}">
-              <ma14:wrappingTextBoxFlag xmlns="" xmlns:ma14="http://schemas.microsoft.com/office/mac/drawingml/2011/main" val="1"/>
+              <ma14:wrappingTextBoxFlag xmlns:ma14="http://schemas.microsoft.com/office/mac/drawingml/2011/main" xmlns="" val="1"/>
             </a:ext>
           </a:extLst>
         </p:spPr>
@@ -5430,7 +5383,7 @@
             </a:pPr>
             <a:r>
               <a:rPr lang="en-SG" dirty="0">
-                <a:latin typeface="Source Sans Pro"/>
+                <a:latin typeface="+mn-lt"/>
                 <a:ea typeface="Source Sans Pro"/>
                 <a:cs typeface="Source Sans Pro"/>
                 <a:sym typeface="Source Sans Pro"/>
@@ -5438,12 +5391,14 @@
               <a:t>Different output format for </a:t>
             </a:r>
             <a:r>
-              <a:rPr lang="en-SG" dirty="0"/>
+              <a:rPr lang="en-SG" dirty="0">
+                <a:latin typeface="+mn-lt"/>
+              </a:rPr>
               <a:t>the </a:t>
             </a:r>
             <a:r>
               <a:rPr lang="en-SG" dirty="0">
-                <a:latin typeface="Source Sans Pro"/>
+                <a:latin typeface="+mn-lt"/>
                 <a:ea typeface="Source Sans Pro"/>
                 <a:cs typeface="Source Sans Pro"/>
                 <a:sym typeface="Source Sans Pro"/>
@@ -5451,7 +5406,7 @@
               <a:t>organised data.</a:t>
             </a:r>
             <a:endParaRPr dirty="0">
-              <a:latin typeface="Source Sans Pro"/>
+              <a:latin typeface="+mn-lt"/>
               <a:ea typeface="Source Sans Pro"/>
               <a:cs typeface="Source Sans Pro"/>
               <a:sym typeface="Source Sans Pro"/>
@@ -5467,8 +5422,8 @@
         </p:nvSpPr>
         <p:spPr>
           <a:xfrm>
-            <a:off x="8447796" y="6338563"/>
-            <a:ext cx="5246100" cy="442605"/>
+            <a:off x="8660812" y="6337347"/>
+            <a:ext cx="4871505" cy="442605"/>
           </a:xfrm>
           <a:prstGeom prst="rect">
             <a:avLst/>
@@ -5478,7 +5433,7 @@
           </a:ln>
           <a:extLst>
             <a:ext uri="{C572A759-6A51-4108-AA02-DFA0A04FC94B}">
-              <ma14:wrappingTextBoxFlag xmlns="" xmlns:ma14="http://schemas.microsoft.com/office/mac/drawingml/2011/main" val="1"/>
+              <ma14:wrappingTextBoxFlag xmlns:ma14="http://schemas.microsoft.com/office/mac/drawingml/2011/main" xmlns="" val="1"/>
             </a:ext>
           </a:extLst>
         </p:spPr>
@@ -5514,7 +5469,7 @@
             </a:pPr>
             <a:r>
               <a:rPr lang="en-SG" dirty="0">
-                <a:latin typeface="Source Sans Pro"/>
+                <a:latin typeface="+mn-lt"/>
                 <a:ea typeface="Source Sans Pro"/>
                 <a:cs typeface="Source Sans Pro"/>
                 <a:sym typeface="Source Sans Pro"/>
@@ -5523,7 +5478,7 @@
             </a:r>
             <a:r>
               <a:rPr lang="en-SG" dirty="0" err="1">
-                <a:latin typeface="Source Sans Pro"/>
+                <a:latin typeface="+mn-lt"/>
                 <a:ea typeface="Source Sans Pro"/>
                 <a:cs typeface="Source Sans Pro"/>
                 <a:sym typeface="Source Sans Pro"/>
@@ -5532,15 +5487,15 @@
             </a:r>
             <a:r>
               <a:rPr lang="en-SG" dirty="0">
-                <a:latin typeface="Source Sans Pro"/>
+                <a:latin typeface="+mn-lt"/>
                 <a:ea typeface="Source Sans Pro"/>
                 <a:cs typeface="Source Sans Pro"/>
                 <a:sym typeface="Source Sans Pro"/>
               </a:rPr>
-              <a:t> to true to let the sample name be the columns instead of the transition names.</a:t>
+              <a:t> to True to let the sample name be the columns instead of the transition names.</a:t>
             </a:r>
             <a:endParaRPr dirty="0">
-              <a:latin typeface="Source Sans Pro"/>
+              <a:latin typeface="+mn-lt"/>
               <a:ea typeface="Source Sans Pro"/>
               <a:cs typeface="Source Sans Pro"/>
               <a:sym typeface="Source Sans Pro"/>
@@ -5557,7 +5512,7 @@
           <p:nvPr/>
         </p:nvPicPr>
         <p:blipFill rotWithShape="1">
-          <a:blip r:embed="rId16"/>
+          <a:blip r:embed="rId14"/>
           <a:srcRect l="-1" r="43937" b="14119"/>
           <a:stretch/>
         </p:blipFill>
@@ -5573,21 +5528,27 @@
       </p:pic>
       <p:pic>
         <p:nvPicPr>
-          <p:cNvPr id="15" name="Picture 14"/>
+          <p:cNvPr id="19" name="Picture 18">
+            <a:extLst>
+              <a:ext uri="{FF2B5EF4-FFF2-40B4-BE49-F238E27FC236}">
+                <a16:creationId xmlns:a16="http://schemas.microsoft.com/office/drawing/2014/main" id="{C7FB022A-CEE4-4F04-8DDE-9C4FDF339E12}"/>
+              </a:ext>
+            </a:extLst>
+          </p:cNvPr>
           <p:cNvPicPr>
             <a:picLocks noChangeAspect="1"/>
           </p:cNvPicPr>
           <p:nvPr/>
         </p:nvPicPr>
         <p:blipFill rotWithShape="1">
-          <a:blip r:embed="rId17"/>
-          <a:srcRect r="40537"/>
+          <a:blip r:embed="rId15"/>
+          <a:srcRect l="3822" t="48746" r="3146" b="6148"/>
           <a:stretch/>
         </p:blipFill>
         <p:spPr>
           <a:xfrm>
-            <a:off x="5297799" y="8472977"/>
-            <a:ext cx="1689857" cy="875916"/>
+            <a:off x="9442151" y="2715158"/>
+            <a:ext cx="3856570" cy="1140458"/>
           </a:xfrm>
           <a:prstGeom prst="rect">
             <a:avLst/>
@@ -5596,21 +5557,33 @@
       </p:pic>
       <p:pic>
         <p:nvPicPr>
-          <p:cNvPr id="16" name="Picture 15"/>
+          <p:cNvPr id="21" name="Picture 20">
+            <a:extLst>
+              <a:ext uri="{FF2B5EF4-FFF2-40B4-BE49-F238E27FC236}">
+                <a16:creationId xmlns:a16="http://schemas.microsoft.com/office/drawing/2014/main" id="{167FA0AA-379D-49E5-B758-0F53EEB1FD98}"/>
+              </a:ext>
+            </a:extLst>
+          </p:cNvPr>
           <p:cNvPicPr>
             <a:picLocks noChangeAspect="1"/>
           </p:cNvPicPr>
           <p:nvPr/>
         </p:nvPicPr>
         <p:blipFill rotWithShape="1">
-          <a:blip r:embed="rId18"/>
-          <a:srcRect r="33579"/>
+          <a:blip r:embed="rId16" cstate="print">
+            <a:extLst>
+              <a:ext uri="{28A0092B-C50C-407E-A947-70E740481C1C}">
+                <a14:useLocalDpi xmlns:a14="http://schemas.microsoft.com/office/drawing/2010/main" val="0"/>
+              </a:ext>
+            </a:extLst>
+          </a:blip>
+          <a:srcRect l="3540" t="48880" r="2320" b="10762"/>
           <a:stretch/>
         </p:blipFill>
         <p:spPr>
           <a:xfrm>
-            <a:off x="5202435" y="9613669"/>
-            <a:ext cx="1860281" cy="867658"/>
+            <a:off x="10673781" y="6884760"/>
+            <a:ext cx="3038188" cy="693325"/>
           </a:xfrm>
           <a:prstGeom prst="rect">
             <a:avLst/>
@@ -5619,38 +5592,95 @@
       </p:pic>
       <p:pic>
         <p:nvPicPr>
-          <p:cNvPr id="17" name="Picture 16"/>
+          <p:cNvPr id="22" name="Picture 21">
+            <a:extLst>
+              <a:ext uri="{FF2B5EF4-FFF2-40B4-BE49-F238E27FC236}">
+                <a16:creationId xmlns:a16="http://schemas.microsoft.com/office/drawing/2014/main" id="{DB7C6F68-9B89-4093-AA60-122C81DEF82D}"/>
+              </a:ext>
+            </a:extLst>
+          </p:cNvPr>
           <p:cNvPicPr>
             <a:picLocks noChangeAspect="1"/>
           </p:cNvPicPr>
           <p:nvPr/>
         </p:nvPicPr>
         <p:blipFill>
-          <a:blip r:embed="rId19"/>
+          <a:blip r:embed="rId17"/>
           <a:stretch>
             <a:fillRect/>
           </a:stretch>
         </p:blipFill>
         <p:spPr>
           <a:xfrm>
-            <a:off x="8841189" y="8614085"/>
-            <a:ext cx="4840723" cy="1652223"/>
+            <a:off x="234883" y="10193988"/>
+            <a:ext cx="4191067" cy="374755"/>
           </a:xfrm>
           <a:prstGeom prst="rect">
             <a:avLst/>
           </a:prstGeom>
+        </p:spPr>
+      </p:pic>
+      <p:pic>
+        <p:nvPicPr>
+          <p:cNvPr id="53" name="Picture 2" descr="https://bytebucket.org/slingnus/msorganiser/raw/27f19bb204966c762e1bddec542f3ee941854853/docs/figures/README-ResultsLongTableAnnot.PNG?token=d9c7286c2ead6acf84dbd659b972ea2db38e2f4e">
+            <a:extLst>
+              <a:ext uri="{FF2B5EF4-FFF2-40B4-BE49-F238E27FC236}">
+                <a16:creationId xmlns:a16="http://schemas.microsoft.com/office/drawing/2014/main" id="{8698ADEA-2247-45C1-A3E9-F29D5B3B4439}"/>
+              </a:ext>
+            </a:extLst>
+          </p:cNvPr>
+          <p:cNvPicPr>
+            <a:picLocks noChangeAspect="1" noChangeArrowheads="1"/>
+          </p:cNvPicPr>
+          <p:nvPr/>
+        </p:nvPicPr>
+        <p:blipFill rotWithShape="1">
+          <a:blip r:embed="rId18">
+            <a:extLst>
+              <a:ext uri="{28A0092B-C50C-407E-A947-70E740481C1C}">
+                <a14:useLocalDpi xmlns:a14="http://schemas.microsoft.com/office/drawing/2010/main" val="0"/>
+              </a:ext>
+            </a:extLst>
+          </a:blip>
+          <a:srcRect l="1806" t="46333" r="1535" b="11590"/>
+          <a:stretch/>
+        </p:blipFill>
+        <p:spPr bwMode="auto">
+          <a:xfrm>
+            <a:off x="7208474" y="9263068"/>
+            <a:ext cx="6547318" cy="1014824"/>
+          </a:xfrm>
+          <a:prstGeom prst="rect">
+            <a:avLst/>
+          </a:prstGeom>
+          <a:noFill/>
+          <a:extLst>
+            <a:ext uri="{909E8E84-426E-40DD-AFC4-6F175D3DCCD1}">
+              <a14:hiddenFill xmlns:a14="http://schemas.microsoft.com/office/drawing/2010/main">
+                <a:solidFill>
+                  <a:srgbClr val="FFFFFF"/>
+                </a:solidFill>
+              </a14:hiddenFill>
+            </a:ext>
+          </a:extLst>
         </p:spPr>
       </p:pic>
       <p:sp>
         <p:nvSpPr>
-          <p:cNvPr id="49" name="Where possible, use code that works when run."/>
+          <p:cNvPr id="54" name="Where possible, use code that works when run.">
+            <a:extLst>
+              <a:ext uri="{FF2B5EF4-FFF2-40B4-BE49-F238E27FC236}">
+                <a16:creationId xmlns:a16="http://schemas.microsoft.com/office/drawing/2014/main" id="{415E190C-34CF-40EE-B714-A6792A7D27CA}"/>
+              </a:ext>
+            </a:extLst>
+          </p:cNvPr>
           <p:cNvSpPr txBox="1"/>
           <p:nvPr/>
         </p:nvSpPr>
         <p:spPr>
           <a:xfrm>
-            <a:off x="5112477" y="8045473"/>
-            <a:ext cx="3210404" cy="276405"/>
+            <a:off x="5074433" y="7734587"/>
+            <a:ext cx="4702901" cy="276405"/>
           </a:xfrm>
           <a:prstGeom prst="rect">
             <a:avLst/>
@@ -5660,7 +5690,7 @@
           </a:ln>
           <a:extLst>
             <a:ext uri="{C572A759-6A51-4108-AA02-DFA0A04FC94B}">
-              <ma14:wrappingTextBoxFlag xmlns="" xmlns:ma14="http://schemas.microsoft.com/office/mac/drawingml/2011/main" val="1"/>
+              <ma14:wrappingTextBoxFlag xmlns:ma14="http://schemas.microsoft.com/office/mac/drawingml/2011/main" xmlns="" val="1"/>
             </a:ext>
           </a:extLst>
         </p:spPr>
@@ -5696,15 +5726,15 @@
             </a:pPr>
             <a:r>
               <a:rPr lang="en-SG" dirty="0">
-                <a:latin typeface="Source Sans Pro"/>
+                <a:latin typeface="+mn-lt"/>
                 <a:ea typeface="Source Sans Pro"/>
                 <a:cs typeface="Source Sans Pro"/>
                 <a:sym typeface="Source Sans Pro"/>
               </a:rPr>
-              <a:t>Long Table output form are available</a:t>
+              <a:t>Options to output results in a Long Table are available</a:t>
             </a:r>
             <a:endParaRPr dirty="0">
-              <a:latin typeface="Source Sans Pro"/>
+              <a:latin typeface="+mn-lt"/>
               <a:ea typeface="Source Sans Pro"/>
               <a:cs typeface="Source Sans Pro"/>
               <a:sym typeface="Source Sans Pro"/>
@@ -5712,74 +5742,421 @@
           </a:p>
         </p:txBody>
       </p:sp>
+      <p:pic>
+        <p:nvPicPr>
+          <p:cNvPr id="24" name="Picture 23">
+            <a:extLst>
+              <a:ext uri="{FF2B5EF4-FFF2-40B4-BE49-F238E27FC236}">
+                <a16:creationId xmlns:a16="http://schemas.microsoft.com/office/drawing/2014/main" id="{F2219D98-CFA9-42FF-B969-A9E95F6A802E}"/>
+              </a:ext>
+            </a:extLst>
+          </p:cNvPr>
+          <p:cNvPicPr>
+            <a:picLocks noChangeAspect="1"/>
+          </p:cNvPicPr>
+          <p:nvPr/>
+        </p:nvPicPr>
+        <p:blipFill rotWithShape="1">
+          <a:blip r:embed="rId19">
+            <a:extLst>
+              <a:ext uri="{28A0092B-C50C-407E-A947-70E740481C1C}">
+                <a14:useLocalDpi xmlns:a14="http://schemas.microsoft.com/office/drawing/2010/main" val="0"/>
+              </a:ext>
+            </a:extLst>
+          </a:blip>
+          <a:srcRect l="2879" t="47576" r="2837" b="9987"/>
+          <a:stretch/>
+        </p:blipFill>
+        <p:spPr>
+          <a:xfrm>
+            <a:off x="7208474" y="8062917"/>
+            <a:ext cx="3948310" cy="905935"/>
+          </a:xfrm>
+          <a:prstGeom prst="rect">
+            <a:avLst/>
+          </a:prstGeom>
+        </p:spPr>
+      </p:pic>
+      <p:pic>
+        <p:nvPicPr>
+          <p:cNvPr id="26" name="Picture 25">
+            <a:extLst>
+              <a:ext uri="{FF2B5EF4-FFF2-40B4-BE49-F238E27FC236}">
+                <a16:creationId xmlns:a16="http://schemas.microsoft.com/office/drawing/2014/main" id="{A2D3DA7A-188C-45C5-A0E4-4933C1961568}"/>
+              </a:ext>
+            </a:extLst>
+          </p:cNvPr>
+          <p:cNvPicPr>
+            <a:picLocks noChangeAspect="1"/>
+          </p:cNvPicPr>
+          <p:nvPr/>
+        </p:nvPicPr>
+        <p:blipFill>
+          <a:blip r:embed="rId20"/>
+          <a:stretch>
+            <a:fillRect/>
+          </a:stretch>
+        </p:blipFill>
+        <p:spPr>
+          <a:xfrm>
+            <a:off x="5133928" y="9375878"/>
+            <a:ext cx="1851072" cy="857444"/>
+          </a:xfrm>
+          <a:prstGeom prst="rect">
+            <a:avLst/>
+          </a:prstGeom>
+        </p:spPr>
+      </p:pic>
+      <p:pic>
+        <p:nvPicPr>
+          <p:cNvPr id="27" name="Picture 26">
+            <a:extLst>
+              <a:ext uri="{FF2B5EF4-FFF2-40B4-BE49-F238E27FC236}">
+                <a16:creationId xmlns:a16="http://schemas.microsoft.com/office/drawing/2014/main" id="{C12E574F-4AC1-4521-8EF2-C6A20E8AAD18}"/>
+              </a:ext>
+            </a:extLst>
+          </p:cNvPr>
+          <p:cNvPicPr>
+            <a:picLocks noChangeAspect="1"/>
+          </p:cNvPicPr>
+          <p:nvPr/>
+        </p:nvPicPr>
+        <p:blipFill>
+          <a:blip r:embed="rId21"/>
+          <a:stretch>
+            <a:fillRect/>
+          </a:stretch>
+        </p:blipFill>
+        <p:spPr>
+          <a:xfrm>
+            <a:off x="5133928" y="8112186"/>
+            <a:ext cx="1851072" cy="820167"/>
+          </a:xfrm>
+          <a:prstGeom prst="rect">
+            <a:avLst/>
+          </a:prstGeom>
+        </p:spPr>
+      </p:pic>
+    </p:spTree>
+  </p:cSld>
+  <p:clrMapOvr>
+    <a:masterClrMapping/>
+  </p:clrMapOvr>
+  <p:transition spd="med"/>
+</p:sld>
+</file>
+
+<file path=ppt/slides/slide2.xml><?xml version="1.0" encoding="utf-8"?>
+<p:sld xmlns:a="http://schemas.openxmlformats.org/drawingml/2006/main" xmlns:r="http://schemas.openxmlformats.org/officeDocument/2006/relationships" xmlns:p="http://schemas.openxmlformats.org/presentationml/2006/main">
+  <p:cSld>
+    <p:spTree>
+      <p:nvGrpSpPr>
+        <p:cNvPr id="1" name=""/>
+        <p:cNvGrpSpPr/>
+        <p:nvPr/>
+      </p:nvGrpSpPr>
+      <p:grpSpPr>
+        <a:xfrm>
+          <a:off x="0" y="0"/>
+          <a:ext cx="0" cy="0"/>
+          <a:chOff x="0" y="0"/>
+          <a:chExt cx="0" cy="0"/>
+        </a:xfrm>
+      </p:grpSpPr>
       <p:sp>
         <p:nvSpPr>
-          <p:cNvPr id="18" name="Right Arrow 17"/>
-          <p:cNvSpPr/>
+          <p:cNvPr id="131" name="Basics"/>
+          <p:cNvSpPr txBox="1"/>
           <p:nvPr/>
         </p:nvSpPr>
         <p:spPr>
           <a:xfrm>
-            <a:off x="7406120" y="9321760"/>
-            <a:ext cx="1164676" cy="162617"/>
+            <a:off x="282688" y="1122325"/>
+            <a:ext cx="2644955" cy="340029"/>
           </a:xfrm>
-          <a:prstGeom prst="rightArrow">
-            <a:avLst/>
-          </a:prstGeom>
-          <a:solidFill>
-            <a:schemeClr val="accent1">
-              <a:lumMod val="20000"/>
-              <a:lumOff val="80000"/>
-            </a:schemeClr>
-          </a:solidFill>
-          <a:ln/>
-        </p:spPr>
-        <p:style>
-          <a:lnRef idx="2">
-            <a:schemeClr val="dk1"/>
-          </a:lnRef>
-          <a:fillRef idx="1">
-            <a:schemeClr val="lt1"/>
-          </a:fillRef>
-          <a:effectRef idx="0">
-            <a:schemeClr val="dk1"/>
-          </a:effectRef>
-          <a:fontRef idx="minor">
-            <a:schemeClr val="dk1"/>
-          </a:fontRef>
-        </p:style>
+          <a:prstGeom prst="rect">
+            <a:avLst/>
+          </a:prstGeom>
+          <a:ln w="12700">
+            <a:miter lim="400000"/>
+          </a:ln>
+          <a:extLst>
+            <a:ext uri="{C572A759-6A51-4108-AA02-DFA0A04FC94B}">
+              <ma14:wrappingTextBoxFlag xmlns:ma14="http://schemas.microsoft.com/office/mac/drawingml/2011/main" xmlns="" val="1"/>
+            </a:ext>
+          </a:extLst>
+        </p:spPr>
         <p:txBody>
-          <a:bodyPr rot="0" spcFirstLastPara="1" vertOverflow="overflow" horzOverflow="overflow" vert="horz" wrap="square" lIns="54570" tIns="54570" rIns="54570" bIns="54570" numCol="1" spcCol="38100" rtlCol="0" anchor="ctr">
+          <a:bodyPr wrap="none" lIns="12700" tIns="12700" rIns="12700" bIns="12700" anchor="ctr">
             <a:spAutoFit/>
           </a:bodyPr>
           <a:lstStyle/>
           <a:p>
-            <a:pPr marL="0" marR="0" indent="0" algn="l" defTabSz="584200" rtl="0" fontAlgn="auto" latinLnBrk="0" hangingPunct="0">
+            <a:pPr lvl="1" indent="0">
               <a:lnSpc>
                 <a:spcPct val="80000"/>
               </a:lnSpc>
               <a:spcBef>
                 <a:spcPts val="0"/>
               </a:spcBef>
-              <a:spcAft>
+              <a:defRPr sz="2500" b="0">
+                <a:solidFill>
+                  <a:srgbClr val="628DB5"/>
+                </a:solidFill>
+              </a:defRPr>
+            </a:pPr>
+            <a:r>
+              <a:rPr lang="en-SG" dirty="0"/>
+              <a:t>Additional Features</a:t>
+            </a:r>
+          </a:p>
+        </p:txBody>
+      </p:sp>
+      <p:sp>
+        <p:nvSpPr>
+          <p:cNvPr id="132" name="Line"/>
+          <p:cNvSpPr/>
+          <p:nvPr/>
+        </p:nvSpPr>
+        <p:spPr>
+          <a:xfrm>
+            <a:off x="344039" y="1060800"/>
+            <a:ext cx="3037294" cy="1"/>
+          </a:xfrm>
+          <a:prstGeom prst="line">
+            <a:avLst/>
+          </a:prstGeom>
+          <a:ln w="3175">
+            <a:solidFill>
+              <a:srgbClr val="FFF2C5"/>
+            </a:solidFill>
+            <a:miter lim="400000"/>
+          </a:ln>
+        </p:spPr>
+        <p:txBody>
+          <a:bodyPr lIns="54570" tIns="54570" rIns="54570" bIns="54570" anchor="ctr"/>
+          <a:lstStyle/>
+          <a:p>
+            <a:pPr>
+              <a:lnSpc>
+                <a:spcPct val="80000"/>
+              </a:lnSpc>
+              <a:spcBef>
+                <a:spcPts val="600"/>
+              </a:spcBef>
+              <a:defRPr b="0">
+                <a:solidFill>
+                  <a:srgbClr val="000000"/>
+                </a:solidFill>
+              </a:defRPr>
+            </a:pPr>
+            <a:endParaRPr/>
+          </a:p>
+        </p:txBody>
+      </p:sp>
+      <p:sp>
+        <p:nvSpPr>
+          <p:cNvPr id="133" name="Four Column Layout : : CHEAT SHEET"/>
+          <p:cNvSpPr txBox="1">
+            <a:spLocks noGrp="1"/>
+          </p:cNvSpPr>
+          <p:nvPr>
+            <p:ph type="title"/>
+          </p:nvPr>
+        </p:nvSpPr>
+        <p:spPr>
+          <a:xfrm>
+            <a:off x="275721" y="361177"/>
+            <a:ext cx="10898129" cy="803346"/>
+          </a:xfrm>
+          <a:prstGeom prst="rect">
+            <a:avLst/>
+          </a:prstGeom>
+        </p:spPr>
+        <p:txBody>
+          <a:bodyPr lIns="0" tIns="0" rIns="0" bIns="0" anchor="t"/>
+          <a:lstStyle/>
+          <a:p>
+            <a:r>
+              <a:rPr lang="en-SG" dirty="0" err="1"/>
+              <a:t>MSOrganiser</a:t>
+            </a:r>
+            <a:r>
+              <a:rPr lang="en-SG" dirty="0"/>
+              <a:t> Summary</a:t>
+            </a:r>
+            <a:endParaRPr dirty="0"/>
+          </a:p>
+        </p:txBody>
+      </p:sp>
+      <p:sp>
+        <p:nvSpPr>
+          <p:cNvPr id="134" name="RStudio® is a trademark of RStudio, Inc.  •  CC BY SA Your Name •  your@email.com  •  844-448-1212 • your.website.com •  Learn more at webpage or vignette   •  package version  0.5.0 •  Updated: 2017-01"/>
+          <p:cNvSpPr txBox="1"/>
+          <p:nvPr/>
+        </p:nvSpPr>
+        <p:spPr>
+          <a:xfrm>
+            <a:off x="12440394" y="10441191"/>
+            <a:ext cx="1379964" cy="234855"/>
+          </a:xfrm>
+          <a:prstGeom prst="rect">
+            <a:avLst/>
+          </a:prstGeom>
+          <a:ln w="12700">
+            <a:miter lim="400000"/>
+          </a:ln>
+          <a:extLst>
+            <a:ext uri="{C572A759-6A51-4108-AA02-DFA0A04FC94B}">
+              <ma14:wrappingTextBoxFlag xmlns:ma14="http://schemas.microsoft.com/office/mac/drawingml/2011/main" xmlns="" val="1"/>
+            </a:ext>
+          </a:extLst>
+        </p:spPr>
+        <p:txBody>
+          <a:bodyPr wrap="square" lIns="54570" tIns="54570" rIns="54570" bIns="54570" anchor="ctr">
+            <a:spAutoFit/>
+          </a:bodyPr>
+          <a:lstStyle/>
+          <a:p>
+            <a:pPr algn="r">
+              <a:lnSpc>
+                <a:spcPct val="90000"/>
+              </a:lnSpc>
+              <a:spcBef>
                 <a:spcPts val="0"/>
-              </a:spcAft>
-              <a:buClrTx/>
-              <a:buSzTx/>
-              <a:buFontTx/>
-              <a:buNone/>
-              <a:tabLst/>
+              </a:spcBef>
+              <a:defRPr sz="900" b="0">
+                <a:solidFill>
+                  <a:srgbClr val="000000"/>
+                </a:solidFill>
+              </a:defRPr>
             </a:pPr>
-            <a:endParaRPr kumimoji="0" lang="en-SG" sz="1200" b="0" i="0" u="none" strike="noStrike" cap="none" spc="0" normalizeH="0" baseline="0">
-              <a:ln>
-                <a:noFill/>
-              </a:ln>
-              <a:solidFill>
-                <a:srgbClr val="000000"/>
-              </a:solidFill>
-              <a:effectLst/>
-              <a:uFillTx/>
-              <a:latin typeface="Source Sans Pro"/>
+            <a:r>
+              <a:rPr dirty="0"/>
+              <a:t>Updated: 20</a:t>
+            </a:r>
+            <a:r>
+              <a:rPr lang="en-SG" dirty="0"/>
+              <a:t>21</a:t>
+            </a:r>
+            <a:r>
+              <a:rPr dirty="0"/>
+              <a:t>-0</a:t>
+            </a:r>
+            <a:r>
+              <a:rPr lang="en-SG" dirty="0"/>
+              <a:t>5</a:t>
+            </a:r>
+            <a:endParaRPr dirty="0"/>
+          </a:p>
+        </p:txBody>
+      </p:sp>
+      <p:sp>
+        <p:nvSpPr>
+          <p:cNvPr id="135" name="Line"/>
+          <p:cNvSpPr/>
+          <p:nvPr/>
+        </p:nvSpPr>
+        <p:spPr>
+          <a:xfrm flipV="1">
+            <a:off x="291339" y="1060799"/>
+            <a:ext cx="6109462" cy="1992"/>
+          </a:xfrm>
+          <a:prstGeom prst="line">
+            <a:avLst/>
+          </a:prstGeom>
+          <a:ln w="3175">
+            <a:solidFill>
+              <a:srgbClr val="767C85"/>
+            </a:solidFill>
+            <a:miter lim="400000"/>
+          </a:ln>
+        </p:spPr>
+        <p:txBody>
+          <a:bodyPr lIns="54570" tIns="54570" rIns="54570" bIns="54570" anchor="ctr"/>
+          <a:lstStyle/>
+          <a:p>
+            <a:pPr>
+              <a:lnSpc>
+                <a:spcPct val="80000"/>
+              </a:lnSpc>
+              <a:spcBef>
+                <a:spcPts val="600"/>
+              </a:spcBef>
+              <a:defRPr b="0">
+                <a:solidFill>
+                  <a:srgbClr val="000000"/>
+                </a:solidFill>
+              </a:defRPr>
+            </a:pPr>
+            <a:endParaRPr/>
+          </a:p>
+        </p:txBody>
+      </p:sp>
+      <p:sp>
+        <p:nvSpPr>
+          <p:cNvPr id="49" name="Where possible, use code that works when run."/>
+          <p:cNvSpPr txBox="1"/>
+          <p:nvPr/>
+        </p:nvSpPr>
+        <p:spPr>
+          <a:xfrm>
+            <a:off x="248425" y="1535535"/>
+            <a:ext cx="5797533" cy="276405"/>
+          </a:xfrm>
+          <a:prstGeom prst="rect">
+            <a:avLst/>
+          </a:prstGeom>
+          <a:ln w="12700">
+            <a:miter lim="400000"/>
+          </a:ln>
+          <a:extLst>
+            <a:ext uri="{C572A759-6A51-4108-AA02-DFA0A04FC94B}">
+              <ma14:wrappingTextBoxFlag xmlns:ma14="http://schemas.microsoft.com/office/mac/drawingml/2011/main" xmlns="" val="1"/>
+            </a:ext>
+          </a:extLst>
+        </p:spPr>
+        <p:txBody>
+          <a:bodyPr wrap="square" lIns="54570" tIns="54570" rIns="54570" bIns="54570" anchor="ctr">
+            <a:spAutoFit/>
+          </a:bodyPr>
+          <a:lstStyle/>
+          <a:p>
+            <a:pPr>
+              <a:lnSpc>
+                <a:spcPct val="90000"/>
+              </a:lnSpc>
+              <a:spcBef>
+                <a:spcPts val="300"/>
+              </a:spcBef>
+              <a:buClr>
+                <a:schemeClr val="accent4">
+                  <a:hueOff val="384618"/>
+                  <a:satOff val="3869"/>
+                  <a:lumOff val="5802"/>
+                </a:schemeClr>
+              </a:buClr>
+              <a:defRPr b="0">
+                <a:solidFill>
+                  <a:srgbClr val="000000"/>
+                </a:solidFill>
+                <a:latin typeface="+mn-lt"/>
+                <a:ea typeface="+mn-ea"/>
+                <a:cs typeface="+mn-cs"/>
+                <a:sym typeface="Source Sans Pro Light"/>
+              </a:defRPr>
+            </a:pPr>
+            <a:r>
+              <a:rPr lang="en-SG" dirty="0">
+                <a:latin typeface="+mn-lt"/>
+                <a:ea typeface="Source Sans Pro"/>
+                <a:cs typeface="Source Sans Pro"/>
+                <a:sym typeface="Source Sans Pro"/>
+              </a:rPr>
+              <a:t>Select the following concatenation options to combine multiple input files to one result file.</a:t>
+            </a:r>
+            <a:endParaRPr dirty="0">
+              <a:latin typeface="+mn-lt"/>
               <a:ea typeface="Source Sans Pro"/>
               <a:cs typeface="Source Sans Pro"/>
               <a:sym typeface="Source Sans Pro"/>
@@ -5787,7 +6164,253 @@
           </a:p>
         </p:txBody>
       </p:sp>
+      <p:pic>
+        <p:nvPicPr>
+          <p:cNvPr id="21" name="Picture 20">
+            <a:extLst>
+              <a:ext uri="{FF2B5EF4-FFF2-40B4-BE49-F238E27FC236}">
+                <a16:creationId xmlns:a16="http://schemas.microsoft.com/office/drawing/2014/main" id="{F472FCD8-9B82-4D60-85AB-EBAF8A8C2160}"/>
+              </a:ext>
+            </a:extLst>
+          </p:cNvPr>
+          <p:cNvPicPr>
+            <a:picLocks noChangeAspect="1"/>
+          </p:cNvPicPr>
+          <p:nvPr/>
+        </p:nvPicPr>
+        <p:blipFill>
+          <a:blip r:embed="rId2"/>
+          <a:stretch>
+            <a:fillRect/>
+          </a:stretch>
+        </p:blipFill>
+        <p:spPr>
+          <a:xfrm>
+            <a:off x="510043" y="1952965"/>
+            <a:ext cx="2843994" cy="1281553"/>
+          </a:xfrm>
+          <a:prstGeom prst="rect">
+            <a:avLst/>
+          </a:prstGeom>
+        </p:spPr>
+      </p:pic>
+      <p:sp>
+        <p:nvSpPr>
+          <p:cNvPr id="53" name="Where possible, use code that works when run.">
+            <a:extLst>
+              <a:ext uri="{FF2B5EF4-FFF2-40B4-BE49-F238E27FC236}">
+                <a16:creationId xmlns:a16="http://schemas.microsoft.com/office/drawing/2014/main" id="{05B0854F-552B-43F1-AA54-50FBE6FCF611}"/>
+              </a:ext>
+            </a:extLst>
+          </p:cNvPr>
+          <p:cNvSpPr txBox="1"/>
+          <p:nvPr/>
+        </p:nvSpPr>
+        <p:spPr>
+          <a:xfrm>
+            <a:off x="275721" y="3297154"/>
+            <a:ext cx="5488346" cy="442605"/>
+          </a:xfrm>
+          <a:prstGeom prst="rect">
+            <a:avLst/>
+          </a:prstGeom>
+          <a:ln w="12700">
+            <a:miter lim="400000"/>
+          </a:ln>
+          <a:extLst>
+            <a:ext uri="{C572A759-6A51-4108-AA02-DFA0A04FC94B}">
+              <ma14:wrappingTextBoxFlag xmlns:ma14="http://schemas.microsoft.com/office/mac/drawingml/2011/main" xmlns="" val="1"/>
+            </a:ext>
+          </a:extLst>
+        </p:spPr>
+        <p:txBody>
+          <a:bodyPr wrap="square" lIns="54570" tIns="54570" rIns="54570" bIns="54570" anchor="ctr">
+            <a:spAutoFit/>
+          </a:bodyPr>
+          <a:lstStyle/>
+          <a:p>
+            <a:pPr>
+              <a:lnSpc>
+                <a:spcPct val="90000"/>
+              </a:lnSpc>
+              <a:spcBef>
+                <a:spcPts val="300"/>
+              </a:spcBef>
+              <a:buClr>
+                <a:schemeClr val="accent4">
+                  <a:hueOff val="384618"/>
+                  <a:satOff val="3869"/>
+                  <a:lumOff val="5802"/>
+                </a:schemeClr>
+              </a:buClr>
+              <a:defRPr b="0">
+                <a:solidFill>
+                  <a:srgbClr val="000000"/>
+                </a:solidFill>
+                <a:latin typeface="+mn-lt"/>
+                <a:ea typeface="+mn-ea"/>
+                <a:cs typeface="+mn-cs"/>
+                <a:sym typeface="Source Sans Pro Light"/>
+              </a:defRPr>
+            </a:pPr>
+            <a:r>
+              <a:rPr lang="en-SG" dirty="0">
+                <a:latin typeface="+mn-lt"/>
+              </a:rPr>
+              <a:t>If there is a need to calculate the normalised area and concentration, set </a:t>
+            </a:r>
+            <a:r>
+              <a:rPr lang="en-SG" b="0" dirty="0" err="1">
+                <a:solidFill>
+                  <a:srgbClr val="000000"/>
+                </a:solidFill>
+              </a:rPr>
+              <a:t>Set</a:t>
+            </a:r>
+            <a:r>
+              <a:rPr lang="en-SG" b="0" dirty="0">
+                <a:solidFill>
+                  <a:srgbClr val="000000"/>
+                </a:solidFill>
+              </a:rPr>
+              <a:t> </a:t>
+            </a:r>
+            <a:r>
+              <a:rPr lang="en-SG" b="0" dirty="0" err="1">
+                <a:solidFill>
+                  <a:srgbClr val="000000"/>
+                </a:solidFill>
+              </a:rPr>
+              <a:t>Allow_Multiple_ISTD</a:t>
+            </a:r>
+            <a:r>
+              <a:rPr lang="en-SG" b="0" dirty="0">
+                <a:solidFill>
+                  <a:srgbClr val="000000"/>
+                </a:solidFill>
+              </a:rPr>
+              <a:t> to True </a:t>
+            </a:r>
+            <a:endParaRPr dirty="0">
+              <a:latin typeface="+mn-lt"/>
+              <a:ea typeface="Source Sans Pro"/>
+              <a:cs typeface="Source Sans Pro"/>
+              <a:sym typeface="Source Sans Pro"/>
+            </a:endParaRPr>
+          </a:p>
+        </p:txBody>
+      </p:sp>
+      <p:pic>
+        <p:nvPicPr>
+          <p:cNvPr id="2052" name="Picture 4" descr="https://bytebucket.org/slingnus/msorganiser/raw/27f19bb204966c762e1bddec542f3ee941854853/docs/figures/README-MultipleISTDOption.PNG?token=a941b9f42d113c5dc465f6679c5f29d3bcf74ad2">
+            <a:extLst>
+              <a:ext uri="{FF2B5EF4-FFF2-40B4-BE49-F238E27FC236}">
+                <a16:creationId xmlns:a16="http://schemas.microsoft.com/office/drawing/2014/main" id="{EA15B832-FCF1-4137-B065-2650A7C68709}"/>
+              </a:ext>
+            </a:extLst>
+          </p:cNvPr>
+          <p:cNvPicPr>
+            <a:picLocks noChangeAspect="1" noChangeArrowheads="1"/>
+          </p:cNvPicPr>
+          <p:nvPr/>
+        </p:nvPicPr>
+        <p:blipFill>
+          <a:blip r:embed="rId3">
+            <a:extLst>
+              <a:ext uri="{28A0092B-C50C-407E-A947-70E740481C1C}">
+                <a14:useLocalDpi xmlns:a14="http://schemas.microsoft.com/office/drawing/2010/main" val="0"/>
+              </a:ext>
+            </a:extLst>
+          </a:blip>
+          <a:srcRect/>
+          <a:stretch>
+            <a:fillRect/>
+          </a:stretch>
+        </p:blipFill>
+        <p:spPr bwMode="auto">
+          <a:xfrm>
+            <a:off x="1515096" y="3891057"/>
+            <a:ext cx="3162300" cy="828675"/>
+          </a:xfrm>
+          <a:prstGeom prst="rect">
+            <a:avLst/>
+          </a:prstGeom>
+          <a:noFill/>
+          <a:extLst>
+            <a:ext uri="{909E8E84-426E-40DD-AFC4-6F175D3DCCD1}">
+              <a14:hiddenFill xmlns:a14="http://schemas.microsoft.com/office/drawing/2010/main">
+                <a:solidFill>
+                  <a:srgbClr val="FFFFFF"/>
+                </a:solidFill>
+              </a14:hiddenFill>
+            </a:ext>
+          </a:extLst>
+        </p:spPr>
+      </p:pic>
+      <p:pic>
+        <p:nvPicPr>
+          <p:cNvPr id="22" name="Picture 21">
+            <a:extLst>
+              <a:ext uri="{FF2B5EF4-FFF2-40B4-BE49-F238E27FC236}">
+                <a16:creationId xmlns:a16="http://schemas.microsoft.com/office/drawing/2014/main" id="{DCD9C00A-53A0-4750-A225-DCD1A8BEABD7}"/>
+              </a:ext>
+            </a:extLst>
+          </p:cNvPr>
+          <p:cNvPicPr>
+            <a:picLocks noChangeAspect="1"/>
+          </p:cNvPicPr>
+          <p:nvPr/>
+        </p:nvPicPr>
+        <p:blipFill rotWithShape="1">
+          <a:blip r:embed="rId4"/>
+          <a:srcRect l="1880" t="45669" r="1722" b="5709"/>
+          <a:stretch/>
+        </p:blipFill>
+        <p:spPr>
+          <a:xfrm>
+            <a:off x="320082" y="4864075"/>
+            <a:ext cx="5579439" cy="1066849"/>
+          </a:xfrm>
+          <a:prstGeom prst="rect">
+            <a:avLst/>
+          </a:prstGeom>
+        </p:spPr>
+      </p:pic>
+      <p:pic>
+        <p:nvPicPr>
+          <p:cNvPr id="23" name="Picture 22">
+            <a:extLst>
+              <a:ext uri="{FF2B5EF4-FFF2-40B4-BE49-F238E27FC236}">
+                <a16:creationId xmlns:a16="http://schemas.microsoft.com/office/drawing/2014/main" id="{FA97951C-0029-4924-83C0-2D0FEBC6A2E6}"/>
+              </a:ext>
+            </a:extLst>
+          </p:cNvPr>
+          <p:cNvPicPr>
+            <a:picLocks noChangeAspect="1"/>
+          </p:cNvPicPr>
+          <p:nvPr/>
+        </p:nvPicPr>
+        <p:blipFill rotWithShape="1">
+          <a:blip r:embed="rId5"/>
+          <a:srcRect r="20303" b="-4351"/>
+          <a:stretch/>
+        </p:blipFill>
+        <p:spPr>
+          <a:xfrm>
+            <a:off x="3524461" y="2289822"/>
+            <a:ext cx="2361505" cy="588365"/>
+          </a:xfrm>
+          <a:prstGeom prst="rect">
+            <a:avLst/>
+          </a:prstGeom>
+        </p:spPr>
+      </p:pic>
     </p:spTree>
+    <p:extLst>
+      <p:ext uri="{BB962C8B-B14F-4D97-AF65-F5344CB8AC3E}">
+        <p14:creationId xmlns:p14="http://schemas.microsoft.com/office/powerpoint/2010/main" val="169483108"/>
+      </p:ext>
+    </p:extLst>
   </p:cSld>
   <p:clrMapOvr>
     <a:masterClrMapping/>

</xml_diff>

<commit_message>
Update Sphinx documentation to include a new test unit and some functions whose documentation I have missed out.
</commit_message>
<xml_diff>
--- a/docs/MSOrganiser_Summary.pptx
+++ b/docs/MSOrganiser_Summary.pptx
@@ -1158,7 +1158,7 @@
           <a:p>
             <a:fld id="{D4884A86-39FE-4630-A5DE-3650BC062DD1}" type="datetimeFigureOut">
               <a:rPr lang="en-SG" smtClean="0"/>
-              <a:t>23/10/2021</a:t>
+              <a:t>28/4/2022</a:t>
             </a:fld>
             <a:endParaRPr lang="en-SG"/>
           </a:p>
@@ -2420,7 +2420,7 @@
           </a:ln>
           <a:extLst>
             <a:ext uri="{C572A759-6A51-4108-AA02-DFA0A04FC94B}">
-              <ma14:wrappingTextBoxFlag xmlns="" xmlns:ma14="http://schemas.microsoft.com/office/mac/drawingml/2011/main" val="1"/>
+              <ma14:wrappingTextBoxFlag xmlns:ma14="http://schemas.microsoft.com/office/mac/drawingml/2011/main" xmlns="" val="1"/>
             </a:ext>
           </a:extLst>
         </p:spPr>
@@ -2459,7 +2459,7 @@
           </a:ln>
           <a:extLst>
             <a:ext uri="{C572A759-6A51-4108-AA02-DFA0A04FC94B}">
-              <ma14:wrappingTextBoxFlag xmlns="" xmlns:ma14="http://schemas.microsoft.com/office/mac/drawingml/2011/main" val="1"/>
+              <ma14:wrappingTextBoxFlag xmlns:ma14="http://schemas.microsoft.com/office/mac/drawingml/2011/main" xmlns="" val="1"/>
             </a:ext>
           </a:extLst>
         </p:spPr>
@@ -3398,7 +3398,7 @@
           </a:ln>
           <a:extLst>
             <a:ext uri="{C572A759-6A51-4108-AA02-DFA0A04FC94B}">
-              <ma14:wrappingTextBoxFlag xmlns="" xmlns:ma14="http://schemas.microsoft.com/office/mac/drawingml/2011/main" val="1"/>
+              <ma14:wrappingTextBoxFlag xmlns:ma14="http://schemas.microsoft.com/office/mac/drawingml/2011/main" xmlns="" val="1"/>
             </a:ext>
           </a:extLst>
         </p:spPr>
@@ -3521,7 +3521,7 @@
           </a:ln>
           <a:extLst>
             <a:ext uri="{C572A759-6A51-4108-AA02-DFA0A04FC94B}">
-              <ma14:wrappingTextBoxFlag xmlns="" xmlns:ma14="http://schemas.microsoft.com/office/mac/drawingml/2011/main" val="1"/>
+              <ma14:wrappingTextBoxFlag xmlns:ma14="http://schemas.microsoft.com/office/mac/drawingml/2011/main" xmlns="" val="1"/>
             </a:ext>
           </a:extLst>
         </p:spPr>
@@ -3583,7 +3583,7 @@
           </a:ln>
           <a:extLst>
             <a:ext uri="{C572A759-6A51-4108-AA02-DFA0A04FC94B}">
-              <ma14:wrappingTextBoxFlag xmlns="" xmlns:ma14="http://schemas.microsoft.com/office/mac/drawingml/2011/main" val="1"/>
+              <ma14:wrappingTextBoxFlag xmlns:ma14="http://schemas.microsoft.com/office/mac/drawingml/2011/main" xmlns="" val="1"/>
             </a:ext>
           </a:extLst>
         </p:spPr>
@@ -3675,7 +3675,7 @@
           </a:ln>
           <a:extLst>
             <a:ext uri="{C572A759-6A51-4108-AA02-DFA0A04FC94B}">
-              <ma14:wrappingTextBoxFlag xmlns="" xmlns:ma14="http://schemas.microsoft.com/office/mac/drawingml/2011/main" val="1"/>
+              <ma14:wrappingTextBoxFlag xmlns:ma14="http://schemas.microsoft.com/office/mac/drawingml/2011/main" xmlns="" val="1"/>
             </a:ext>
           </a:extLst>
         </p:spPr>
@@ -3713,7 +3713,7 @@
           </a:ln>
           <a:extLst>
             <a:ext uri="{C572A759-6A51-4108-AA02-DFA0A04FC94B}">
-              <ma14:wrappingTextBoxFlag xmlns="" xmlns:ma14="http://schemas.microsoft.com/office/mac/drawingml/2011/main" val="1"/>
+              <ma14:wrappingTextBoxFlag xmlns:ma14="http://schemas.microsoft.com/office/mac/drawingml/2011/main" xmlns="" val="1"/>
             </a:ext>
           </a:extLst>
         </p:spPr>
@@ -3784,7 +3784,7 @@
           </a:ln>
           <a:extLst>
             <a:ext uri="{C572A759-6A51-4108-AA02-DFA0A04FC94B}">
-              <ma14:wrappingTextBoxFlag xmlns="" xmlns:ma14="http://schemas.microsoft.com/office/mac/drawingml/2011/main" val="1"/>
+              <ma14:wrappingTextBoxFlag xmlns:ma14="http://schemas.microsoft.com/office/mac/drawingml/2011/main" xmlns="" val="1"/>
             </a:ext>
           </a:extLst>
         </p:spPr>
@@ -3834,7 +3834,7 @@
           </a:ln>
           <a:extLst>
             <a:ext uri="{C572A759-6A51-4108-AA02-DFA0A04FC94B}">
-              <ma14:wrappingTextBoxFlag xmlns="" xmlns:ma14="http://schemas.microsoft.com/office/mac/drawingml/2011/main" val="1"/>
+              <ma14:wrappingTextBoxFlag xmlns:ma14="http://schemas.microsoft.com/office/mac/drawingml/2011/main" xmlns="" val="1"/>
             </a:ext>
           </a:extLst>
         </p:spPr>
@@ -3872,7 +3872,7 @@
           </a:ln>
           <a:extLst>
             <a:ext uri="{C572A759-6A51-4108-AA02-DFA0A04FC94B}">
-              <ma14:wrappingTextBoxFlag xmlns="" xmlns:ma14="http://schemas.microsoft.com/office/mac/drawingml/2011/main" val="1"/>
+              <ma14:wrappingTextBoxFlag xmlns:ma14="http://schemas.microsoft.com/office/mac/drawingml/2011/main" xmlns="" val="1"/>
             </a:ext>
           </a:extLst>
         </p:spPr>
@@ -3987,7 +3987,7 @@
           </a:ln>
           <a:extLst>
             <a:ext uri="{C572A759-6A51-4108-AA02-DFA0A04FC94B}">
-              <ma14:wrappingTextBoxFlag xmlns="" xmlns:ma14="http://schemas.microsoft.com/office/mac/drawingml/2011/main" val="1"/>
+              <ma14:wrappingTextBoxFlag xmlns:ma14="http://schemas.microsoft.com/office/mac/drawingml/2011/main" xmlns="" val="1"/>
             </a:ext>
           </a:extLst>
         </p:spPr>
@@ -4025,7 +4025,7 @@
           </a:ln>
           <a:extLst>
             <a:ext uri="{C572A759-6A51-4108-AA02-DFA0A04FC94B}">
-              <ma14:wrappingTextBoxFlag xmlns="" xmlns:ma14="http://schemas.microsoft.com/office/mac/drawingml/2011/main" val="1"/>
+              <ma14:wrappingTextBoxFlag xmlns:ma14="http://schemas.microsoft.com/office/mac/drawingml/2011/main" xmlns="" val="1"/>
             </a:ext>
           </a:extLst>
         </p:spPr>
@@ -4111,7 +4111,7 @@
           </a:ln>
           <a:extLst>
             <a:ext uri="{C572A759-6A51-4108-AA02-DFA0A04FC94B}">
-              <ma14:wrappingTextBoxFlag xmlns="" xmlns:ma14="http://schemas.microsoft.com/office/mac/drawingml/2011/main" val="1"/>
+              <ma14:wrappingTextBoxFlag xmlns:ma14="http://schemas.microsoft.com/office/mac/drawingml/2011/main" xmlns="" val="1"/>
             </a:ext>
           </a:extLst>
         </p:spPr>
@@ -4317,7 +4317,7 @@
           </a:ln>
           <a:extLst>
             <a:ext uri="{C572A759-6A51-4108-AA02-DFA0A04FC94B}">
-              <ma14:wrappingTextBoxFlag xmlns="" xmlns:ma14="http://schemas.microsoft.com/office/mac/drawingml/2011/main" val="1"/>
+              <ma14:wrappingTextBoxFlag xmlns:ma14="http://schemas.microsoft.com/office/mac/drawingml/2011/main" xmlns="" val="1"/>
             </a:ext>
           </a:extLst>
         </p:spPr>
@@ -4355,7 +4355,7 @@
           </a:ln>
           <a:extLst>
             <a:ext uri="{C572A759-6A51-4108-AA02-DFA0A04FC94B}">
-              <ma14:wrappingTextBoxFlag xmlns="" xmlns:ma14="http://schemas.microsoft.com/office/mac/drawingml/2011/main" val="1"/>
+              <ma14:wrappingTextBoxFlag xmlns:ma14="http://schemas.microsoft.com/office/mac/drawingml/2011/main" xmlns="" val="1"/>
             </a:ext>
           </a:extLst>
         </p:spPr>
@@ -5929,7 +5929,7 @@
           </a:ln>
           <a:extLst>
             <a:ext uri="{C572A759-6A51-4108-AA02-DFA0A04FC94B}">
-              <ma14:wrappingTextBoxFlag xmlns:ma14="http://schemas.microsoft.com/office/mac/drawingml/2011/main" xmlns="" val="1"/>
+              <ma14:wrappingTextBoxFlag xmlns="" xmlns:ma14="http://schemas.microsoft.com/office/mac/drawingml/2011/main" val="1"/>
             </a:ext>
           </a:extLst>
         </p:spPr>
@@ -6091,7 +6091,7 @@
           </a:ln>
           <a:extLst>
             <a:ext uri="{C572A759-6A51-4108-AA02-DFA0A04FC94B}">
-              <ma14:wrappingTextBoxFlag xmlns:ma14="http://schemas.microsoft.com/office/mac/drawingml/2011/main" xmlns="" val="1"/>
+              <ma14:wrappingTextBoxFlag xmlns="" xmlns:ma14="http://schemas.microsoft.com/office/mac/drawingml/2011/main" val="1"/>
             </a:ext>
           </a:extLst>
         </p:spPr>
@@ -6160,7 +6160,7 @@
           </a:ln>
           <a:extLst>
             <a:ext uri="{C572A759-6A51-4108-AA02-DFA0A04FC94B}">
-              <ma14:wrappingTextBoxFlag xmlns:ma14="http://schemas.microsoft.com/office/mac/drawingml/2011/main" xmlns="" val="1"/>
+              <ma14:wrappingTextBoxFlag xmlns="" xmlns:ma14="http://schemas.microsoft.com/office/mac/drawingml/2011/main" val="1"/>
             </a:ext>
           </a:extLst>
         </p:spPr>
@@ -6229,7 +6229,7 @@
           </a:ln>
           <a:extLst>
             <a:ext uri="{C572A759-6A51-4108-AA02-DFA0A04FC94B}">
-              <ma14:wrappingTextBoxFlag xmlns:ma14="http://schemas.microsoft.com/office/mac/drawingml/2011/main" xmlns="" val="1"/>
+              <ma14:wrappingTextBoxFlag xmlns="" xmlns:ma14="http://schemas.microsoft.com/office/mac/drawingml/2011/main" val="1"/>
             </a:ext>
           </a:extLst>
         </p:spPr>
@@ -6298,7 +6298,7 @@
           </a:ln>
           <a:extLst>
             <a:ext uri="{C572A759-6A51-4108-AA02-DFA0A04FC94B}">
-              <ma14:wrappingTextBoxFlag xmlns:ma14="http://schemas.microsoft.com/office/mac/drawingml/2011/main" xmlns="" val="1"/>
+              <ma14:wrappingTextBoxFlag xmlns="" xmlns:ma14="http://schemas.microsoft.com/office/mac/drawingml/2011/main" val="1"/>
             </a:ext>
           </a:extLst>
         </p:spPr>
@@ -6367,7 +6367,7 @@
           </a:ln>
           <a:extLst>
             <a:ext uri="{C572A759-6A51-4108-AA02-DFA0A04FC94B}">
-              <ma14:wrappingTextBoxFlag xmlns="" xmlns:ma14="http://schemas.microsoft.com/office/mac/drawingml/2011/main" val="1"/>
+              <ma14:wrappingTextBoxFlag xmlns:ma14="http://schemas.microsoft.com/office/mac/drawingml/2011/main" xmlns="" val="1"/>
             </a:ext>
           </a:extLst>
         </p:spPr>
@@ -6483,7 +6483,7 @@
           </a:ln>
           <a:extLst>
             <a:ext uri="{C572A759-6A51-4108-AA02-DFA0A04FC94B}">
-              <ma14:wrappingTextBoxFlag xmlns="" xmlns:ma14="http://schemas.microsoft.com/office/mac/drawingml/2011/main" val="1"/>
+              <ma14:wrappingTextBoxFlag xmlns:ma14="http://schemas.microsoft.com/office/mac/drawingml/2011/main" xmlns="" val="1"/>
             </a:ext>
           </a:extLst>
         </p:spPr>
@@ -6575,7 +6575,7 @@
           </a:ln>
           <a:extLst>
             <a:ext uri="{C572A759-6A51-4108-AA02-DFA0A04FC94B}">
-              <ma14:wrappingTextBoxFlag xmlns="" xmlns:ma14="http://schemas.microsoft.com/office/mac/drawingml/2011/main" val="1"/>
+              <ma14:wrappingTextBoxFlag xmlns:ma14="http://schemas.microsoft.com/office/mac/drawingml/2011/main" xmlns="" val="1"/>
             </a:ext>
           </a:extLst>
         </p:spPr>
@@ -6687,7 +6687,7 @@
           </a:ln>
           <a:extLst>
             <a:ext uri="{C572A759-6A51-4108-AA02-DFA0A04FC94B}">
-              <ma14:wrappingTextBoxFlag xmlns="" xmlns:ma14="http://schemas.microsoft.com/office/mac/drawingml/2011/main" val="1"/>
+              <ma14:wrappingTextBoxFlag xmlns:ma14="http://schemas.microsoft.com/office/mac/drawingml/2011/main" xmlns="" val="1"/>
             </a:ext>
           </a:extLst>
         </p:spPr>
@@ -6967,7 +6967,7 @@
           </a:ln>
           <a:extLst>
             <a:ext uri="{C572A759-6A51-4108-AA02-DFA0A04FC94B}">
-              <ma14:wrappingTextBoxFlag xmlns="" xmlns:ma14="http://schemas.microsoft.com/office/mac/drawingml/2011/main" val="1"/>
+              <ma14:wrappingTextBoxFlag xmlns:ma14="http://schemas.microsoft.com/office/mac/drawingml/2011/main" xmlns="" val="1"/>
             </a:ext>
           </a:extLst>
         </p:spPr>
@@ -7074,7 +7074,7 @@
           </a:ln>
           <a:extLst>
             <a:ext uri="{C572A759-6A51-4108-AA02-DFA0A04FC94B}">
-              <ma14:wrappingTextBoxFlag xmlns="" xmlns:ma14="http://schemas.microsoft.com/office/mac/drawingml/2011/main" val="1"/>
+              <ma14:wrappingTextBoxFlag xmlns:ma14="http://schemas.microsoft.com/office/mac/drawingml/2011/main" xmlns="" val="1"/>
             </a:ext>
           </a:extLst>
         </p:spPr>
@@ -7147,8 +7147,8 @@
           <a:chExt cx="0" cy="0"/>
         </a:xfrm>
       </p:grpSpPr>
-      <mc:AlternateContent xmlns:mc="http://schemas.openxmlformats.org/markup-compatibility/2006">
-        <mc:Choice xmlns:a14="http://schemas.microsoft.com/office/drawing/2010/main" Requires="a14">
+      <mc:AlternateContent xmlns:mc="http://schemas.openxmlformats.org/markup-compatibility/2006" xmlns:a14="http://schemas.microsoft.com/office/drawing/2010/main">
+        <mc:Choice Requires="a14">
           <p:sp>
             <p:nvSpPr>
               <p:cNvPr id="6" name="TextBox 5">
@@ -7246,7 +7246,7 @@
             </p:txBody>
           </p:sp>
         </mc:Choice>
-        <mc:Fallback>
+        <mc:Fallback xmlns="">
           <p:sp>
             <p:nvSpPr>
               <p:cNvPr id="6" name="TextBox 5">
@@ -7404,8 +7404,8 @@
           </a:fontRef>
         </p:style>
       </p:cxnSp>
-      <mc:AlternateContent xmlns:mc="http://schemas.openxmlformats.org/markup-compatibility/2006">
-        <mc:Choice xmlns:a14="http://schemas.microsoft.com/office/drawing/2010/main" Requires="a14">
+      <mc:AlternateContent xmlns:mc="http://schemas.openxmlformats.org/markup-compatibility/2006" xmlns:a14="http://schemas.microsoft.com/office/drawing/2010/main">
+        <mc:Choice Requires="a14">
           <p:sp>
             <p:nvSpPr>
               <p:cNvPr id="15" name="TextBox 14">
@@ -7538,7 +7538,7 @@
             </p:txBody>
           </p:sp>
         </mc:Choice>
-        <mc:Fallback>
+        <mc:Fallback xmlns="">
           <p:sp>
             <p:nvSpPr>
               <p:cNvPr id="15" name="TextBox 14">
@@ -7649,7 +7649,7 @@
           </a:ln>
           <a:extLst>
             <a:ext uri="{C572A759-6A51-4108-AA02-DFA0A04FC94B}">
-              <ma14:wrappingTextBoxFlag xmlns="" xmlns:ma14="http://schemas.microsoft.com/office/mac/drawingml/2011/main" val="1"/>
+              <ma14:wrappingTextBoxFlag xmlns:ma14="http://schemas.microsoft.com/office/mac/drawingml/2011/main" xmlns="" val="1"/>
             </a:ext>
           </a:extLst>
         </p:spPr>
@@ -8008,7 +8008,7 @@
           </a:ln>
           <a:extLst>
             <a:ext uri="{C572A759-6A51-4108-AA02-DFA0A04FC94B}">
-              <ma14:wrappingTextBoxFlag xmlns="" xmlns:ma14="http://schemas.microsoft.com/office/mac/drawingml/2011/main" val="1"/>
+              <ma14:wrappingTextBoxFlag xmlns:ma14="http://schemas.microsoft.com/office/mac/drawingml/2011/main" xmlns="" val="1"/>
             </a:ext>
           </a:extLst>
         </p:spPr>
@@ -8130,7 +8130,7 @@
           </a:ln>
           <a:extLst>
             <a:ext uri="{C572A759-6A51-4108-AA02-DFA0A04FC94B}">
-              <ma14:wrappingTextBoxFlag xmlns="" xmlns:ma14="http://schemas.microsoft.com/office/mac/drawingml/2011/main" val="1"/>
+              <ma14:wrappingTextBoxFlag xmlns:ma14="http://schemas.microsoft.com/office/mac/drawingml/2011/main" xmlns="" val="1"/>
             </a:ext>
           </a:extLst>
         </p:spPr>
@@ -8198,7 +8198,7 @@
           </a:ln>
           <a:extLst>
             <a:ext uri="{C572A759-6A51-4108-AA02-DFA0A04FC94B}">
-              <ma14:wrappingTextBoxFlag xmlns="" xmlns:ma14="http://schemas.microsoft.com/office/mac/drawingml/2011/main" val="1"/>
+              <ma14:wrappingTextBoxFlag xmlns:ma14="http://schemas.microsoft.com/office/mac/drawingml/2011/main" xmlns="" val="1"/>
             </a:ext>
           </a:extLst>
         </p:spPr>
@@ -8401,7 +8401,7 @@
           </a:ln>
           <a:extLst>
             <a:ext uri="{C572A759-6A51-4108-AA02-DFA0A04FC94B}">
-              <ma14:wrappingTextBoxFlag xmlns="" xmlns:ma14="http://schemas.microsoft.com/office/mac/drawingml/2011/main" val="1"/>
+              <ma14:wrappingTextBoxFlag xmlns:ma14="http://schemas.microsoft.com/office/mac/drawingml/2011/main" xmlns="" val="1"/>
             </a:ext>
           </a:extLst>
         </p:spPr>
@@ -8946,8 +8946,8 @@
           <a:chExt cx="0" cy="0"/>
         </a:xfrm>
       </p:grpSpPr>
-      <mc:AlternateContent xmlns:mc="http://schemas.openxmlformats.org/markup-compatibility/2006">
-        <mc:Choice xmlns:a14="http://schemas.microsoft.com/office/drawing/2010/main" Requires="a14">
+      <mc:AlternateContent xmlns:mc="http://schemas.openxmlformats.org/markup-compatibility/2006" xmlns:a14="http://schemas.microsoft.com/office/drawing/2010/main">
+        <mc:Choice Requires="a14">
           <p:sp>
             <p:nvSpPr>
               <p:cNvPr id="4" name="TextBox 3">
@@ -9039,16 +9039,7 @@
                                   </a:solidFill>
                                   <a:latin typeface="Cambria Math" panose="02040503050406030204" pitchFamily="18" charset="0"/>
                                 </a:rPr>
-                                <m:t>𝑓𝑚</m:t>
-                              </m:r>
-                              <m:r>
-                                <a:rPr lang="en-SG" sz="4583" b="0" i="1">
-                                  <a:solidFill>
-                                    <a:srgbClr val="996633"/>
-                                  </a:solidFill>
-                                  <a:latin typeface="Cambria Math" panose="02040503050406030204" pitchFamily="18" charset="0"/>
-                                </a:rPr>
-                                <m:t>𝑜𝑙</m:t>
+                                <m:t>𝑓𝑚𝑜𝑙</m:t>
                               </m:r>
                             </m:num>
                             <m:den>
@@ -9296,7 +9287,7 @@
             </p:txBody>
           </p:sp>
         </mc:Choice>
-        <mc:Fallback>
+        <mc:Fallback xmlns="">
           <p:sp>
             <p:nvSpPr>
               <p:cNvPr id="4" name="TextBox 3">
@@ -9438,8 +9429,8 @@
           </a:p>
         </p:txBody>
       </p:sp>
-      <mc:AlternateContent xmlns:mc="http://schemas.openxmlformats.org/markup-compatibility/2006">
-        <mc:Choice xmlns:a14="http://schemas.microsoft.com/office/drawing/2010/main" Requires="a14">
+      <mc:AlternateContent xmlns:mc="http://schemas.openxmlformats.org/markup-compatibility/2006" xmlns:a14="http://schemas.microsoft.com/office/drawing/2010/main">
+        <mc:Choice Requires="a14">
           <p:sp>
             <p:nvSpPr>
               <p:cNvPr id="11" name="TextBox 10">
@@ -9532,7 +9523,7 @@
             </p:txBody>
           </p:sp>
         </mc:Choice>
-        <mc:Fallback>
+        <mc:Fallback xmlns="">
           <p:sp>
             <p:nvSpPr>
               <p:cNvPr id="11" name="TextBox 10">
@@ -9577,8 +9568,8 @@
           </p:sp>
         </mc:Fallback>
       </mc:AlternateContent>
-      <mc:AlternateContent xmlns:mc="http://schemas.openxmlformats.org/markup-compatibility/2006">
-        <mc:Choice xmlns:a14="http://schemas.microsoft.com/office/drawing/2010/main" Requires="a14">
+      <mc:AlternateContent xmlns:mc="http://schemas.openxmlformats.org/markup-compatibility/2006" xmlns:a14="http://schemas.microsoft.com/office/drawing/2010/main">
+        <mc:Choice Requires="a14">
           <p:sp>
             <p:nvSpPr>
               <p:cNvPr id="13" name="TextBox 12">
@@ -9707,7 +9698,7 @@
             </p:txBody>
           </p:sp>
         </mc:Choice>
-        <mc:Fallback>
+        <mc:Fallback xmlns="">
           <p:sp>
             <p:nvSpPr>
               <p:cNvPr id="13" name="TextBox 12">
@@ -9752,8 +9743,8 @@
           </p:sp>
         </mc:Fallback>
       </mc:AlternateContent>
-      <mc:AlternateContent xmlns:mc="http://schemas.openxmlformats.org/markup-compatibility/2006">
-        <mc:Choice xmlns:a14="http://schemas.microsoft.com/office/drawing/2010/main" Requires="a14">
+      <mc:AlternateContent xmlns:mc="http://schemas.openxmlformats.org/markup-compatibility/2006" xmlns:a14="http://schemas.microsoft.com/office/drawing/2010/main">
+        <mc:Choice Requires="a14">
           <p:sp>
             <p:nvSpPr>
               <p:cNvPr id="14" name="TextBox 13">
@@ -9834,7 +9825,7 @@
             </p:txBody>
           </p:sp>
         </mc:Choice>
-        <mc:Fallback>
+        <mc:Fallback xmlns="">
           <p:sp>
             <p:nvSpPr>
               <p:cNvPr id="14" name="TextBox 13">
@@ -9930,8 +9921,8 @@
           </a:p>
         </p:txBody>
       </p:sp>
-      <mc:AlternateContent xmlns:mc="http://schemas.openxmlformats.org/markup-compatibility/2006">
-        <mc:Choice xmlns:a14="http://schemas.microsoft.com/office/drawing/2010/main" Requires="a14">
+      <mc:AlternateContent xmlns:mc="http://schemas.openxmlformats.org/markup-compatibility/2006" xmlns:a14="http://schemas.microsoft.com/office/drawing/2010/main">
+        <mc:Choice Requires="a14">
           <p:sp>
             <p:nvSpPr>
               <p:cNvPr id="16" name="TextBox 15">
@@ -10078,7 +10069,7 @@
             </p:txBody>
           </p:sp>
         </mc:Choice>
-        <mc:Fallback>
+        <mc:Fallback xmlns="">
           <p:sp>
             <p:nvSpPr>
               <p:cNvPr id="16" name="TextBox 15">
@@ -10286,8 +10277,8 @@
           </a:p>
         </p:txBody>
       </p:sp>
-      <mc:AlternateContent xmlns:mc="http://schemas.openxmlformats.org/markup-compatibility/2006">
-        <mc:Choice xmlns:a14="http://schemas.microsoft.com/office/drawing/2010/main" Requires="a14">
+      <mc:AlternateContent xmlns:mc="http://schemas.openxmlformats.org/markup-compatibility/2006" xmlns:a14="http://schemas.microsoft.com/office/drawing/2010/main">
+        <mc:Choice Requires="a14">
           <p:sp>
             <p:nvSpPr>
               <p:cNvPr id="25" name="TextBox 24">
@@ -10380,7 +10371,7 @@
             </p:txBody>
           </p:sp>
         </mc:Choice>
-        <mc:Fallback>
+        <mc:Fallback xmlns="">
           <p:sp>
             <p:nvSpPr>
               <p:cNvPr id="25" name="TextBox 24">
@@ -10533,8 +10524,8 @@
           <a:chExt cx="0" cy="0"/>
         </a:xfrm>
       </p:grpSpPr>
-      <mc:AlternateContent xmlns:mc="http://schemas.openxmlformats.org/markup-compatibility/2006">
-        <mc:Choice xmlns:a14="http://schemas.microsoft.com/office/drawing/2010/main" Requires="a14">
+      <mc:AlternateContent xmlns:mc="http://schemas.openxmlformats.org/markup-compatibility/2006" xmlns:a14="http://schemas.microsoft.com/office/drawing/2010/main">
+        <mc:Choice Requires="a14">
           <p:sp>
             <p:nvSpPr>
               <p:cNvPr id="21" name="TextBox 20">
@@ -10745,7 +10736,7 @@
             </p:txBody>
           </p:sp>
         </mc:Choice>
-        <mc:Fallback>
+        <mc:Fallback xmlns="">
           <p:sp>
             <p:nvSpPr>
               <p:cNvPr id="21" name="TextBox 20">
@@ -10827,8 +10818,8 @@
           </a:p>
         </p:txBody>
       </p:sp>
-      <mc:AlternateContent xmlns:mc="http://schemas.openxmlformats.org/markup-compatibility/2006">
-        <mc:Choice xmlns:a14="http://schemas.microsoft.com/office/drawing/2010/main" Requires="a14">
+      <mc:AlternateContent xmlns:mc="http://schemas.openxmlformats.org/markup-compatibility/2006" xmlns:a14="http://schemas.microsoft.com/office/drawing/2010/main">
+        <mc:Choice Requires="a14">
           <p:sp>
             <p:nvSpPr>
               <p:cNvPr id="10" name="TextBox 9">
@@ -10920,16 +10911,7 @@
                                   </a:solidFill>
                                   <a:latin typeface="Cambria Math" panose="02040503050406030204" pitchFamily="18" charset="0"/>
                                 </a:rPr>
-                                <m:t>𝑓𝑚</m:t>
-                              </m:r>
-                              <m:r>
-                                <a:rPr lang="en-SG" sz="4583" b="0" i="1">
-                                  <a:solidFill>
-                                    <a:srgbClr val="996633"/>
-                                  </a:solidFill>
-                                  <a:latin typeface="Cambria Math" panose="02040503050406030204" pitchFamily="18" charset="0"/>
-                                </a:rPr>
-                                <m:t>𝑜𝑙</m:t>
+                                <m:t>𝑓𝑚𝑜𝑙</m:t>
                               </m:r>
                             </m:num>
                             <m:den>
@@ -11177,7 +11159,7 @@
             </p:txBody>
           </p:sp>
         </mc:Choice>
-        <mc:Fallback>
+        <mc:Fallback xmlns="">
           <p:sp>
             <p:nvSpPr>
               <p:cNvPr id="10" name="TextBox 9">
@@ -11222,8 +11204,8 @@
           </p:sp>
         </mc:Fallback>
       </mc:AlternateContent>
-      <mc:AlternateContent xmlns:mc="http://schemas.openxmlformats.org/markup-compatibility/2006">
-        <mc:Choice xmlns:a14="http://schemas.microsoft.com/office/drawing/2010/main" Requires="a14">
+      <mc:AlternateContent xmlns:mc="http://schemas.openxmlformats.org/markup-compatibility/2006" xmlns:a14="http://schemas.microsoft.com/office/drawing/2010/main">
+        <mc:Choice Requires="a14">
           <p:sp>
             <p:nvSpPr>
               <p:cNvPr id="12" name="TextBox 11">
@@ -11453,7 +11435,7 @@
             </p:txBody>
           </p:sp>
         </mc:Choice>
-        <mc:Fallback>
+        <mc:Fallback xmlns="">
           <p:sp>
             <p:nvSpPr>
               <p:cNvPr id="12" name="TextBox 11">
@@ -11644,8 +11626,8 @@
           </a:prstGeom>
         </p:spPr>
       </p:pic>
-      <mc:AlternateContent xmlns:mc="http://schemas.openxmlformats.org/markup-compatibility/2006">
-        <mc:Choice xmlns:a14="http://schemas.microsoft.com/office/drawing/2010/main" Requires="a14">
+      <mc:AlternateContent xmlns:mc="http://schemas.openxmlformats.org/markup-compatibility/2006" xmlns:a14="http://schemas.microsoft.com/office/drawing/2010/main">
+        <mc:Choice Requires="a14">
           <p:sp>
             <p:nvSpPr>
               <p:cNvPr id="5" name="TextBox 4">
@@ -11764,7 +11746,7 @@
             </p:txBody>
           </p:sp>
         </mc:Choice>
-        <mc:Fallback>
+        <mc:Fallback xmlns="">
           <p:sp>
             <p:nvSpPr>
               <p:cNvPr id="5" name="TextBox 4">
@@ -11893,8 +11875,8 @@
           </a:fontRef>
         </p:style>
       </p:cxnSp>
-      <mc:AlternateContent xmlns:mc="http://schemas.openxmlformats.org/markup-compatibility/2006">
-        <mc:Choice xmlns:a14="http://schemas.microsoft.com/office/drawing/2010/main" Requires="a14">
+      <mc:AlternateContent xmlns:mc="http://schemas.openxmlformats.org/markup-compatibility/2006" xmlns:a14="http://schemas.microsoft.com/office/drawing/2010/main">
+        <mc:Choice Requires="a14">
           <p:sp>
             <p:nvSpPr>
               <p:cNvPr id="8" name="TextBox 7">
@@ -12024,7 +12006,7 @@
             </p:txBody>
           </p:sp>
         </mc:Choice>
-        <mc:Fallback>
+        <mc:Fallback xmlns="">
           <p:sp>
             <p:nvSpPr>
               <p:cNvPr id="8" name="TextBox 7">
@@ -12147,773 +12129,6 @@
           </a:fontRef>
         </p:style>
       </p:cxnSp>
-      <mc:AlternateContent xmlns:mc="http://schemas.openxmlformats.org/markup-compatibility/2006" xmlns:a14="http://schemas.microsoft.com/office/drawing/2010/main">
-        <mc:Choice Requires="a14">
-          <p:sp>
-            <p:nvSpPr>
-              <p:cNvPr id="16" name="TextBox 1">
-                <a:extLst>
-                  <a:ext uri="{FF2B5EF4-FFF2-40B4-BE49-F238E27FC236}">
-                    <a16:creationId xmlns:a16="http://schemas.microsoft.com/office/drawing/2014/main" id="{655DF021-091B-4217-9121-AABCB09C0498}"/>
-                  </a:ext>
-                </a:extLst>
-              </p:cNvPr>
-              <p:cNvSpPr txBox="1"/>
-              <p:nvPr/>
-            </p:nvSpPr>
-            <p:spPr>
-              <a:xfrm>
-                <a:off x="376615" y="1419578"/>
-                <a:ext cx="5920295" cy="3637849"/>
-              </a:xfrm>
-              <a:prstGeom prst="rect">
-                <a:avLst/>
-              </a:prstGeom>
-              <a:solidFill>
-                <a:schemeClr val="lt1"/>
-              </a:solidFill>
-              <a:ln w="9525" cmpd="sng">
-                <a:solidFill>
-                  <a:schemeClr val="lt1">
-                    <a:shade val="50000"/>
-                  </a:schemeClr>
-                </a:solidFill>
-              </a:ln>
-            </p:spPr>
-            <p:style>
-              <a:lnRef idx="0">
-                <a:scrgbClr r="0" g="0" b="0"/>
-              </a:lnRef>
-              <a:fillRef idx="0">
-                <a:scrgbClr r="0" g="0" b="0"/>
-              </a:fillRef>
-              <a:effectRef idx="0">
-                <a:scrgbClr r="0" g="0" b="0"/>
-              </a:effectRef>
-              <a:fontRef idx="minor">
-                <a:schemeClr val="dk1"/>
-              </a:fontRef>
-            </p:style>
-            <p:txBody>
-              <a:bodyPr wrap="square" rtlCol="0" anchor="t"/>
-              <a:lstStyle>
-                <a:lvl1pPr marL="0" indent="0">
-                  <a:defRPr sz="1100">
-                    <a:solidFill>
-                      <a:schemeClr val="dk1"/>
-                    </a:solidFill>
-                    <a:latin typeface="+mn-lt"/>
-                    <a:ea typeface="+mn-ea"/>
-                    <a:cs typeface="+mn-cs"/>
-                  </a:defRPr>
-                </a:lvl1pPr>
-                <a:lvl2pPr marL="457200" indent="0">
-                  <a:defRPr sz="1100">
-                    <a:solidFill>
-                      <a:schemeClr val="dk1"/>
-                    </a:solidFill>
-                    <a:latin typeface="+mn-lt"/>
-                    <a:ea typeface="+mn-ea"/>
-                    <a:cs typeface="+mn-cs"/>
-                  </a:defRPr>
-                </a:lvl2pPr>
-                <a:lvl3pPr marL="914400" indent="0">
-                  <a:defRPr sz="1100">
-                    <a:solidFill>
-                      <a:schemeClr val="dk1"/>
-                    </a:solidFill>
-                    <a:latin typeface="+mn-lt"/>
-                    <a:ea typeface="+mn-ea"/>
-                    <a:cs typeface="+mn-cs"/>
-                  </a:defRPr>
-                </a:lvl3pPr>
-                <a:lvl4pPr marL="1371600" indent="0">
-                  <a:defRPr sz="1100">
-                    <a:solidFill>
-                      <a:schemeClr val="dk1"/>
-                    </a:solidFill>
-                    <a:latin typeface="+mn-lt"/>
-                    <a:ea typeface="+mn-ea"/>
-                    <a:cs typeface="+mn-cs"/>
-                  </a:defRPr>
-                </a:lvl4pPr>
-                <a:lvl5pPr marL="1828800" indent="0">
-                  <a:defRPr sz="1100">
-                    <a:solidFill>
-                      <a:schemeClr val="dk1"/>
-                    </a:solidFill>
-                    <a:latin typeface="+mn-lt"/>
-                    <a:ea typeface="+mn-ea"/>
-                    <a:cs typeface="+mn-cs"/>
-                  </a:defRPr>
-                </a:lvl5pPr>
-                <a:lvl6pPr marL="2286000" indent="0">
-                  <a:defRPr sz="1100">
-                    <a:solidFill>
-                      <a:schemeClr val="dk1"/>
-                    </a:solidFill>
-                    <a:latin typeface="+mn-lt"/>
-                    <a:ea typeface="+mn-ea"/>
-                    <a:cs typeface="+mn-cs"/>
-                  </a:defRPr>
-                </a:lvl6pPr>
-                <a:lvl7pPr marL="2743200" indent="0">
-                  <a:defRPr sz="1100">
-                    <a:solidFill>
-                      <a:schemeClr val="dk1"/>
-                    </a:solidFill>
-                    <a:latin typeface="+mn-lt"/>
-                    <a:ea typeface="+mn-ea"/>
-                    <a:cs typeface="+mn-cs"/>
-                  </a:defRPr>
-                </a:lvl7pPr>
-                <a:lvl8pPr marL="3200400" indent="0">
-                  <a:defRPr sz="1100">
-                    <a:solidFill>
-                      <a:schemeClr val="dk1"/>
-                    </a:solidFill>
-                    <a:latin typeface="+mn-lt"/>
-                    <a:ea typeface="+mn-ea"/>
-                    <a:cs typeface="+mn-cs"/>
-                  </a:defRPr>
-                </a:lvl8pPr>
-                <a:lvl9pPr marL="3657600" indent="0">
-                  <a:defRPr sz="1100">
-                    <a:solidFill>
-                      <a:schemeClr val="dk1"/>
-                    </a:solidFill>
-                    <a:latin typeface="+mn-lt"/>
-                    <a:ea typeface="+mn-ea"/>
-                    <a:cs typeface="+mn-cs"/>
-                  </a:defRPr>
-                </a:lvl9pPr>
-              </a:lstStyle>
-              <a:p>
-                <a:pPr marL="261930">
-                  <a:spcAft>
-                    <a:spcPts val="917"/>
-                  </a:spcAft>
-                </a:pPr>
-                <a:r>
-                  <a:rPr lang="en-SG" sz="1375" dirty="0">
-                    <a:latin typeface="Times New Roman" panose="02020603050405020304" pitchFamily="18" charset="0"/>
-                    <a:ea typeface="Calibri" panose="020F0502020204030204" pitchFamily="34" charset="0"/>
-                    <a:cs typeface="Times New Roman" panose="02020603050405020304" pitchFamily="18" charset="0"/>
-                  </a:rPr>
-                  <a:t>Assuming the analyte and the selected ISTD have identical response factors, the concentration of an analyte in the sample can be calculated as</a:t>
-                </a:r>
-              </a:p>
-              <a:p>
-                <a:pPr marL="261930">
-                  <a:spcAft>
-                    <a:spcPts val="917"/>
-                  </a:spcAft>
-                </a:pPr>
-                <a14:m>
-                  <m:oMath xmlns:m="http://schemas.openxmlformats.org/officeDocument/2006/math">
-                    <m:sSub>
-                      <m:sSubPr>
-                        <m:ctrlPr>
-                          <a:rPr lang="en-SG" sz="1833" i="1">
-                            <a:latin typeface="Cambria Math" panose="02040503050406030204" pitchFamily="18" charset="0"/>
-                            <a:ea typeface="Calibri" panose="020F0502020204030204" pitchFamily="34" charset="0"/>
-                            <a:cs typeface="Times New Roman" panose="02020603050405020304" pitchFamily="18" charset="0"/>
-                          </a:rPr>
-                        </m:ctrlPr>
-                      </m:sSubPr>
-                      <m:e>
-                        <m:r>
-                          <a:rPr lang="en-US" sz="1833" i="1">
-                            <a:latin typeface="Cambria Math" panose="02040503050406030204" pitchFamily="18" charset="0"/>
-                            <a:ea typeface="Calibri" panose="020F0502020204030204" pitchFamily="34" charset="0"/>
-                            <a:cs typeface="Times New Roman" panose="02020603050405020304" pitchFamily="18" charset="0"/>
-                          </a:rPr>
-                          <m:t>𝑐</m:t>
-                        </m:r>
-                      </m:e>
-                      <m:sub>
-                        <m:r>
-                          <m:rPr>
-                            <m:sty m:val="p"/>
-                          </m:rPr>
-                          <a:rPr lang="en-US" sz="1833">
-                            <a:latin typeface="Cambria Math" panose="02040503050406030204" pitchFamily="18" charset="0"/>
-                            <a:ea typeface="Calibri" panose="020F0502020204030204" pitchFamily="34" charset="0"/>
-                            <a:cs typeface="Times New Roman" panose="02020603050405020304" pitchFamily="18" charset="0"/>
-                          </a:rPr>
-                          <m:t>Analyte</m:t>
-                        </m:r>
-                      </m:sub>
-                    </m:sSub>
-                    <m:r>
-                      <a:rPr lang="en-US" sz="1833">
-                        <a:latin typeface="Cambria Math" panose="02040503050406030204" pitchFamily="18" charset="0"/>
-                        <a:ea typeface="Calibri" panose="020F0502020204030204" pitchFamily="34" charset="0"/>
-                        <a:cs typeface="Times New Roman" panose="02020603050405020304" pitchFamily="18" charset="0"/>
-                      </a:rPr>
-                      <m:t>=</m:t>
-                    </m:r>
-                    <m:f>
-                      <m:fPr>
-                        <m:ctrlPr>
-                          <a:rPr lang="en-SG" sz="1833" i="1">
-                            <a:latin typeface="Cambria Math" panose="02040503050406030204" pitchFamily="18" charset="0"/>
-                            <a:ea typeface="DengXian"/>
-                            <a:cs typeface="Times New Roman" panose="02020603050405020304" pitchFamily="18" charset="0"/>
-                          </a:rPr>
-                        </m:ctrlPr>
-                      </m:fPr>
-                      <m:num>
-                        <m:sSub>
-                          <m:sSubPr>
-                            <m:ctrlPr>
-                              <a:rPr lang="en-SG" sz="1833" i="1">
-                                <a:latin typeface="Cambria Math" panose="02040503050406030204" pitchFamily="18" charset="0"/>
-                                <a:ea typeface="Calibri" panose="020F0502020204030204" pitchFamily="34" charset="0"/>
-                                <a:cs typeface="Times New Roman" panose="02020603050405020304" pitchFamily="18" charset="0"/>
-                              </a:rPr>
-                            </m:ctrlPr>
-                          </m:sSubPr>
-                          <m:e>
-                            <m:r>
-                              <a:rPr lang="en-US" sz="1833" i="1">
-                                <a:latin typeface="Cambria Math" panose="02040503050406030204" pitchFamily="18" charset="0"/>
-                                <a:ea typeface="Calibri" panose="020F0502020204030204" pitchFamily="34" charset="0"/>
-                                <a:cs typeface="Times New Roman" panose="02020603050405020304" pitchFamily="18" charset="0"/>
-                              </a:rPr>
-                              <m:t>𝐴𝑟𝑒𝑎</m:t>
-                            </m:r>
-                          </m:e>
-                          <m:sub>
-                            <m:r>
-                              <m:rPr>
-                                <m:sty m:val="p"/>
-                              </m:rPr>
-                              <a:rPr lang="en-US" sz="1833">
-                                <a:latin typeface="Cambria Math" panose="02040503050406030204" pitchFamily="18" charset="0"/>
-                                <a:ea typeface="Calibri" panose="020F0502020204030204" pitchFamily="34" charset="0"/>
-                                <a:cs typeface="Times New Roman" panose="02020603050405020304" pitchFamily="18" charset="0"/>
-                              </a:rPr>
-                              <m:t>Analyte</m:t>
-                            </m:r>
-                          </m:sub>
-                        </m:sSub>
-                      </m:num>
-                      <m:den>
-                        <m:sSub>
-                          <m:sSubPr>
-                            <m:ctrlPr>
-                              <a:rPr lang="en-SG" sz="1833" i="1">
-                                <a:latin typeface="Cambria Math" panose="02040503050406030204" pitchFamily="18" charset="0"/>
-                                <a:ea typeface="Calibri" panose="020F0502020204030204" pitchFamily="34" charset="0"/>
-                                <a:cs typeface="Times New Roman" panose="02020603050405020304" pitchFamily="18" charset="0"/>
-                              </a:rPr>
-                            </m:ctrlPr>
-                          </m:sSubPr>
-                          <m:e>
-                            <m:r>
-                              <a:rPr lang="en-US" sz="1833" i="1">
-                                <a:latin typeface="Cambria Math" panose="02040503050406030204" pitchFamily="18" charset="0"/>
-                                <a:ea typeface="Calibri" panose="020F0502020204030204" pitchFamily="34" charset="0"/>
-                                <a:cs typeface="Times New Roman" panose="02020603050405020304" pitchFamily="18" charset="0"/>
-                              </a:rPr>
-                              <m:t>𝐴𝑟𝑒𝑎</m:t>
-                            </m:r>
-                          </m:e>
-                          <m:sub>
-                            <m:r>
-                              <m:rPr>
-                                <m:sty m:val="p"/>
-                              </m:rPr>
-                              <a:rPr lang="en-US" sz="1833">
-                                <a:latin typeface="Cambria Math" panose="02040503050406030204" pitchFamily="18" charset="0"/>
-                                <a:ea typeface="Calibri" panose="020F0502020204030204" pitchFamily="34" charset="0"/>
-                                <a:cs typeface="Times New Roman" panose="02020603050405020304" pitchFamily="18" charset="0"/>
-                              </a:rPr>
-                              <m:t>ISTD</m:t>
-                            </m:r>
-                          </m:sub>
-                        </m:sSub>
-                      </m:den>
-                    </m:f>
-                    <m:r>
-                      <a:rPr lang="en-US" sz="1833">
-                        <a:latin typeface="Cambria Math" panose="02040503050406030204" pitchFamily="18" charset="0"/>
-                        <a:ea typeface="Calibri" panose="020F0502020204030204" pitchFamily="34" charset="0"/>
-                        <a:cs typeface="Times New Roman" panose="02020603050405020304" pitchFamily="18" charset="0"/>
-                      </a:rPr>
-                      <m:t>× </m:t>
-                    </m:r>
-                    <m:f>
-                      <m:fPr>
-                        <m:ctrlPr>
-                          <a:rPr lang="en-SG" sz="1833" i="1">
-                            <a:latin typeface="Cambria Math" panose="02040503050406030204" pitchFamily="18" charset="0"/>
-                            <a:ea typeface="Calibri" panose="020F0502020204030204" pitchFamily="34" charset="0"/>
-                            <a:cs typeface="Times New Roman" panose="02020603050405020304" pitchFamily="18" charset="0"/>
-                          </a:rPr>
-                        </m:ctrlPr>
-                      </m:fPr>
-                      <m:num>
-                        <m:sSub>
-                          <m:sSubPr>
-                            <m:ctrlPr>
-                              <a:rPr lang="en-SG" sz="1833" i="1">
-                                <a:latin typeface="Cambria Math" panose="02040503050406030204" pitchFamily="18" charset="0"/>
-                              </a:rPr>
-                            </m:ctrlPr>
-                          </m:sSubPr>
-                          <m:e>
-                            <m:r>
-                              <a:rPr lang="en-US" sz="1833" b="0" i="1">
-                                <a:latin typeface="Cambria Math" panose="02040503050406030204" pitchFamily="18" charset="0"/>
-                              </a:rPr>
-                              <m:t>𝑣</m:t>
-                            </m:r>
-                          </m:e>
-                          <m:sub>
-                            <m:r>
-                              <m:rPr>
-                                <m:sty m:val="p"/>
-                              </m:rPr>
-                              <a:rPr lang="en-US" sz="1833">
-                                <a:latin typeface="Cambria Math" panose="02040503050406030204" pitchFamily="18" charset="0"/>
-                              </a:rPr>
-                              <m:t>ISTD</m:t>
-                            </m:r>
-                          </m:sub>
-                        </m:sSub>
-                      </m:num>
-                      <m:den>
-                        <m:r>
-                          <a:rPr lang="en-US" sz="1833" b="0" i="1">
-                            <a:latin typeface="Cambria Math" panose="02040503050406030204" pitchFamily="18" charset="0"/>
-                            <a:ea typeface="Calibri" panose="020F0502020204030204" pitchFamily="34" charset="0"/>
-                            <a:cs typeface="Times New Roman" panose="02020603050405020304" pitchFamily="18" charset="0"/>
-                          </a:rPr>
-                          <m:t>𝑆𝑎𝑚𝑝𝑙𝑒</m:t>
-                        </m:r>
-                        <m:r>
-                          <a:rPr lang="en-US" sz="1833" b="0" i="1">
-                            <a:latin typeface="Cambria Math" panose="02040503050406030204" pitchFamily="18" charset="0"/>
-                            <a:ea typeface="Calibri" panose="020F0502020204030204" pitchFamily="34" charset="0"/>
-                            <a:cs typeface="Times New Roman" panose="02020603050405020304" pitchFamily="18" charset="0"/>
-                          </a:rPr>
-                          <m:t> </m:t>
-                        </m:r>
-                        <m:r>
-                          <a:rPr lang="en-US" sz="1833" b="0" i="1">
-                            <a:latin typeface="Cambria Math" panose="02040503050406030204" pitchFamily="18" charset="0"/>
-                            <a:ea typeface="Calibri" panose="020F0502020204030204" pitchFamily="34" charset="0"/>
-                            <a:cs typeface="Times New Roman" panose="02020603050405020304" pitchFamily="18" charset="0"/>
-                          </a:rPr>
-                          <m:t>𝐴𝑚𝑜𝑢𝑛𝑡</m:t>
-                        </m:r>
-                        <m:r>
-                          <a:rPr lang="en-US" sz="1833" b="0" i="1">
-                            <a:latin typeface="Cambria Math" panose="02040503050406030204" pitchFamily="18" charset="0"/>
-                            <a:ea typeface="Calibri" panose="020F0502020204030204" pitchFamily="34" charset="0"/>
-                            <a:cs typeface="Times New Roman" panose="02020603050405020304" pitchFamily="18" charset="0"/>
-                          </a:rPr>
-                          <m:t> </m:t>
-                        </m:r>
-                      </m:den>
-                    </m:f>
-                    <m:r>
-                      <a:rPr lang="en-US" sz="1833" b="0">
-                        <a:latin typeface="Cambria Math" panose="02040503050406030204" pitchFamily="18" charset="0"/>
-                      </a:rPr>
-                      <m:t> </m:t>
-                    </m:r>
-                    <m:r>
-                      <a:rPr lang="en-US" sz="1604" b="0">
-                        <a:latin typeface="Cambria Math" panose="02040503050406030204" pitchFamily="18" charset="0"/>
-                      </a:rPr>
-                      <m:t> </m:t>
-                    </m:r>
-                    <m:r>
-                      <a:rPr lang="en-US" sz="1604">
-                        <a:latin typeface="Cambria Math" panose="02040503050406030204" pitchFamily="18" charset="0"/>
-                      </a:rPr>
-                      <m:t>×</m:t>
-                    </m:r>
-                    <m:sSub>
-                      <m:sSubPr>
-                        <m:ctrlPr>
-                          <a:rPr lang="en-US" sz="1604" b="0" i="1">
-                            <a:latin typeface="Cambria Math" panose="02040503050406030204" pitchFamily="18" charset="0"/>
-                          </a:rPr>
-                        </m:ctrlPr>
-                      </m:sSubPr>
-                      <m:e>
-                        <m:r>
-                          <a:rPr lang="en-US" sz="1604" b="0" i="1">
-                            <a:latin typeface="Cambria Math" panose="02040503050406030204" pitchFamily="18" charset="0"/>
-                          </a:rPr>
-                          <m:t>𝑐</m:t>
-                        </m:r>
-                      </m:e>
-                      <m:sub>
-                        <m:r>
-                          <a:rPr lang="en-US" sz="1604" b="0" i="1">
-                            <a:latin typeface="Cambria Math" panose="02040503050406030204" pitchFamily="18" charset="0"/>
-                          </a:rPr>
-                          <m:t>𝐼𝑆𝑇𝐷</m:t>
-                        </m:r>
-                      </m:sub>
-                    </m:sSub>
-                    <m:r>
-                      <a:rPr lang="en-US" sz="1833" b="0" i="1">
-                        <a:latin typeface="Cambria Math" panose="02040503050406030204" pitchFamily="18" charset="0"/>
-                        <a:ea typeface="Calibri" panose="020F0502020204030204" pitchFamily="34" charset="0"/>
-                        <a:cs typeface="Times New Roman" panose="02020603050405020304" pitchFamily="18" charset="0"/>
-                      </a:rPr>
-                      <m:t> </m:t>
-                    </m:r>
-                  </m:oMath>
-                </a14:m>
-                <a:r>
-                  <a:rPr lang="en-US" sz="1375" i="1" dirty="0">
-                    <a:ea typeface="Calibri" panose="020F0502020204030204" pitchFamily="34" charset="0"/>
-                    <a:cs typeface="Times New Roman" panose="02020603050405020304" pitchFamily="18" charset="0"/>
-                  </a:rPr>
-                  <a:t>   </a:t>
-                </a:r>
-              </a:p>
-              <a:p>
-                <a:pPr marL="261930">
-                  <a:spcAft>
-                    <a:spcPts val="917"/>
-                  </a:spcAft>
-                </a:pPr>
-                <a:r>
-                  <a:rPr lang="en-US" sz="1260" dirty="0">
-                    <a:latin typeface="Times New Roman" panose="02020603050405020304" pitchFamily="18" charset="0"/>
-                    <a:ea typeface="Calibri" panose="020F0502020204030204" pitchFamily="34" charset="0"/>
-                  </a:rPr>
-                  <a:t>where</a:t>
-                </a:r>
-              </a:p>
-              <a:p>
-                <a:pPr marL="261930">
-                  <a:spcAft>
-                    <a:spcPts val="917"/>
-                  </a:spcAft>
-                </a:pPr>
-                <a:r>
-                  <a:rPr lang="en-US" sz="1260" i="1" dirty="0" err="1">
-                    <a:latin typeface="Times New Roman" panose="02020603050405020304" pitchFamily="18" charset="0"/>
-                    <a:ea typeface="Calibri" panose="020F0502020204030204" pitchFamily="34" charset="0"/>
-                  </a:rPr>
-                  <a:t>c</a:t>
-                </a:r>
-                <a:r>
-                  <a:rPr lang="en-US" sz="1260" i="1" baseline="-25000" dirty="0" err="1">
-                    <a:latin typeface="Times New Roman" panose="02020603050405020304" pitchFamily="18" charset="0"/>
-                    <a:ea typeface="Calibri" panose="020F0502020204030204" pitchFamily="34" charset="0"/>
-                  </a:rPr>
-                  <a:t>Analyte</a:t>
-                </a:r>
-                <a:r>
-                  <a:rPr lang="en-US" sz="1260" dirty="0">
-                    <a:latin typeface="Times New Roman" panose="02020603050405020304" pitchFamily="18" charset="0"/>
-                    <a:ea typeface="Calibri" panose="020F0502020204030204" pitchFamily="34" charset="0"/>
-                  </a:rPr>
-                  <a:t>: 		molar concentration of the analyte in the sample</a:t>
-                </a:r>
-                <a:endParaRPr lang="en-US" sz="1260" i="1" dirty="0">
-                  <a:latin typeface="Times New Roman" panose="02020603050405020304" pitchFamily="18" charset="0"/>
-                  <a:ea typeface="Calibri" panose="020F0502020204030204" pitchFamily="34" charset="0"/>
-                </a:endParaRPr>
-              </a:p>
-              <a:p>
-                <a:pPr marL="261930" defTabSz="1047720" hangingPunct="1">
-                  <a:spcBef>
-                    <a:spcPts val="0"/>
-                  </a:spcBef>
-                  <a:spcAft>
-                    <a:spcPts val="917"/>
-                  </a:spcAft>
-                  <a:defRPr/>
-                </a:pPr>
-                <a:r>
-                  <a:rPr lang="en-US" sz="1260" i="1" dirty="0" err="1">
-                    <a:latin typeface="Times New Roman" panose="02020603050405020304" pitchFamily="18" charset="0"/>
-                    <a:cs typeface="Times New Roman" panose="02020603050405020304" pitchFamily="18" charset="0"/>
-                  </a:rPr>
-                  <a:t>Area</a:t>
-                </a:r>
-                <a:r>
-                  <a:rPr lang="en-US" sz="1260" i="1" baseline="-25000" dirty="0" err="1">
-                    <a:latin typeface="Times New Roman" panose="02020603050405020304" pitchFamily="18" charset="0"/>
-                    <a:cs typeface="Times New Roman" panose="02020603050405020304" pitchFamily="18" charset="0"/>
-                  </a:rPr>
-                  <a:t>Analyte</a:t>
-                </a:r>
-                <a:r>
-                  <a:rPr lang="en-US" sz="1260" dirty="0">
-                    <a:latin typeface="Times New Roman" panose="02020603050405020304" pitchFamily="18" charset="0"/>
-                    <a:cs typeface="Times New Roman" panose="02020603050405020304" pitchFamily="18" charset="0"/>
-                  </a:rPr>
-                  <a:t>:</a:t>
-                </a:r>
-                <a:r>
-                  <a:rPr lang="en-US" sz="1260" i="1" dirty="0">
-                    <a:latin typeface="Times New Roman" panose="02020603050405020304" pitchFamily="18" charset="0"/>
-                    <a:cs typeface="Times New Roman" panose="02020603050405020304" pitchFamily="18" charset="0"/>
-                  </a:rPr>
-                  <a:t> 		</a:t>
-                </a:r>
-                <a:r>
-                  <a:rPr lang="en-US" sz="1260" dirty="0">
-                    <a:latin typeface="Times New Roman" panose="02020603050405020304" pitchFamily="18" charset="0"/>
-                    <a:cs typeface="Times New Roman" panose="02020603050405020304" pitchFamily="18" charset="0"/>
-                  </a:rPr>
-                  <a:t>peak area of analyte,</a:t>
-                </a:r>
-                <a:r>
-                  <a:rPr lang="en-US" sz="1260" i="1" dirty="0">
-                    <a:latin typeface="Times New Roman" panose="02020603050405020304" pitchFamily="18" charset="0"/>
-                    <a:cs typeface="Times New Roman" panose="02020603050405020304" pitchFamily="18" charset="0"/>
-                  </a:rPr>
-                  <a:t>  </a:t>
-                </a:r>
-              </a:p>
-              <a:p>
-                <a:pPr marL="261930" defTabSz="1047720" hangingPunct="1">
-                  <a:spcBef>
-                    <a:spcPts val="0"/>
-                  </a:spcBef>
-                  <a:spcAft>
-                    <a:spcPts val="917"/>
-                  </a:spcAft>
-                  <a:defRPr/>
-                </a:pPr>
-                <a:r>
-                  <a:rPr lang="en-US" sz="1260" i="1" dirty="0" err="1">
-                    <a:latin typeface="Times New Roman" panose="02020603050405020304" pitchFamily="18" charset="0"/>
-                    <a:cs typeface="Times New Roman" panose="02020603050405020304" pitchFamily="18" charset="0"/>
-                  </a:rPr>
-                  <a:t>Area</a:t>
-                </a:r>
-                <a:r>
-                  <a:rPr lang="en-US" sz="1260" i="1" baseline="-25000" dirty="0" err="1">
-                    <a:latin typeface="Times New Roman" panose="02020603050405020304" pitchFamily="18" charset="0"/>
-                    <a:cs typeface="Times New Roman" panose="02020603050405020304" pitchFamily="18" charset="0"/>
-                  </a:rPr>
-                  <a:t>ISTD</a:t>
-                </a:r>
-                <a:r>
-                  <a:rPr lang="en-US" sz="1260" dirty="0">
-                    <a:latin typeface="Times New Roman" panose="02020603050405020304" pitchFamily="18" charset="0"/>
-                    <a:cs typeface="Times New Roman" panose="02020603050405020304" pitchFamily="18" charset="0"/>
-                  </a:rPr>
-                  <a:t>:</a:t>
-                </a:r>
-                <a:r>
-                  <a:rPr lang="en-US" sz="1260" i="1" dirty="0">
-                    <a:latin typeface="Times New Roman" panose="02020603050405020304" pitchFamily="18" charset="0"/>
-                    <a:cs typeface="Times New Roman" panose="02020603050405020304" pitchFamily="18" charset="0"/>
-                  </a:rPr>
-                  <a:t> 		</a:t>
-                </a:r>
-                <a:r>
-                  <a:rPr lang="en-US" sz="1260" dirty="0">
-                    <a:latin typeface="Times New Roman" panose="02020603050405020304" pitchFamily="18" charset="0"/>
-                    <a:cs typeface="Times New Roman" panose="02020603050405020304" pitchFamily="18" charset="0"/>
-                  </a:rPr>
-                  <a:t>peak area of ISTD,</a:t>
-                </a:r>
-              </a:p>
-              <a:p>
-                <a:pPr marL="261930">
-                  <a:spcAft>
-                    <a:spcPts val="917"/>
-                  </a:spcAft>
-                </a:pPr>
-                <a:r>
-                  <a:rPr lang="en-US" sz="1260" i="1" dirty="0" err="1">
-                    <a:latin typeface="Times New Roman" panose="02020603050405020304" pitchFamily="18" charset="0"/>
-                    <a:cs typeface="Times New Roman" panose="02020603050405020304" pitchFamily="18" charset="0"/>
-                  </a:rPr>
-                  <a:t>v</a:t>
-                </a:r>
-                <a:r>
-                  <a:rPr lang="en-US" sz="1260" i="1" baseline="-25000" dirty="0" err="1">
-                    <a:latin typeface="Times New Roman" panose="02020603050405020304" pitchFamily="18" charset="0"/>
-                    <a:cs typeface="Times New Roman" panose="02020603050405020304" pitchFamily="18" charset="0"/>
-                  </a:rPr>
-                  <a:t>ISTD</a:t>
-                </a:r>
-                <a:r>
-                  <a:rPr lang="en-US" sz="1260" dirty="0">
-                    <a:latin typeface="Times New Roman" panose="02020603050405020304" pitchFamily="18" charset="0"/>
-                    <a:cs typeface="Times New Roman" panose="02020603050405020304" pitchFamily="18" charset="0"/>
-                  </a:rPr>
-                  <a:t>:</a:t>
-                </a:r>
-                <a:r>
-                  <a:rPr lang="en-US" sz="1260" dirty="0"/>
-                  <a:t> 		</a:t>
-                </a:r>
-                <a:r>
-                  <a:rPr lang="en-US" sz="1260" dirty="0">
-                    <a:latin typeface="Times New Roman" panose="02020603050405020304" pitchFamily="18" charset="0"/>
-                    <a:cs typeface="Times New Roman" panose="02020603050405020304" pitchFamily="18" charset="0"/>
-                  </a:rPr>
-                  <a:t>extracted</a:t>
-                </a:r>
-                <a:r>
-                  <a:rPr lang="en-US" sz="1260" dirty="0"/>
-                  <a:t> </a:t>
-                </a:r>
-                <a:r>
-                  <a:rPr lang="en-US" sz="1260" dirty="0">
-                    <a:latin typeface="Times New Roman" panose="02020603050405020304" pitchFamily="18" charset="0"/>
-                    <a:cs typeface="Times New Roman" panose="02020603050405020304" pitchFamily="18" charset="0"/>
-                  </a:rPr>
-                  <a:t>volume from the ISTD mixture,</a:t>
-                </a:r>
-              </a:p>
-              <a:p>
-                <a:pPr marL="261930" defTabSz="1047720" hangingPunct="1">
-                  <a:spcBef>
-                    <a:spcPts val="0"/>
-                  </a:spcBef>
-                  <a:spcAft>
-                    <a:spcPts val="917"/>
-                  </a:spcAft>
-                  <a:defRPr/>
-                </a:pPr>
-                <a:r>
-                  <a:rPr lang="en-US" sz="1260" i="1" dirty="0" err="1">
-                    <a:latin typeface="Times New Roman" panose="02020603050405020304" pitchFamily="18" charset="0"/>
-                    <a:cs typeface="Times New Roman" panose="02020603050405020304" pitchFamily="18" charset="0"/>
-                  </a:rPr>
-                  <a:t>Sample_Amount</a:t>
-                </a:r>
-                <a:r>
-                  <a:rPr lang="en-US" sz="1260" dirty="0">
-                    <a:latin typeface="Times New Roman" panose="02020603050405020304" pitchFamily="18" charset="0"/>
-                    <a:cs typeface="Times New Roman" panose="02020603050405020304" pitchFamily="18" charset="0"/>
-                  </a:rPr>
-                  <a:t>: 	quantity of the sample, </a:t>
-                </a:r>
-                <a:endParaRPr lang="en-SG" sz="1260" dirty="0">
-                  <a:latin typeface="Times New Roman" panose="02020603050405020304" pitchFamily="18" charset="0"/>
-                  <a:cs typeface="Times New Roman" panose="02020603050405020304" pitchFamily="18" charset="0"/>
-                </a:endParaRPr>
-              </a:p>
-              <a:p>
-                <a:pPr marL="261930" defTabSz="1047720" hangingPunct="1">
-                  <a:spcBef>
-                    <a:spcPts val="0"/>
-                  </a:spcBef>
-                  <a:spcAft>
-                    <a:spcPts val="917"/>
-                  </a:spcAft>
-                  <a:defRPr/>
-                </a:pPr>
-                <a:r>
-                  <a:rPr lang="en-US" sz="1260" i="1" dirty="0" err="1">
-                    <a:latin typeface="Times New Roman" panose="02020603050405020304" pitchFamily="18" charset="0"/>
-                    <a:cs typeface="Times New Roman" panose="02020603050405020304" pitchFamily="18" charset="0"/>
-                  </a:rPr>
-                  <a:t>c</a:t>
-                </a:r>
-                <a:r>
-                  <a:rPr lang="en-US" sz="1260" i="1" baseline="-25000" dirty="0" err="1">
-                    <a:latin typeface="Times New Roman" panose="02020603050405020304" pitchFamily="18" charset="0"/>
-                    <a:cs typeface="Times New Roman" panose="02020603050405020304" pitchFamily="18" charset="0"/>
-                  </a:rPr>
-                  <a:t>ISTD</a:t>
-                </a:r>
-                <a:r>
-                  <a:rPr lang="en-US" sz="1260" dirty="0">
-                    <a:latin typeface="Times New Roman" panose="02020603050405020304" pitchFamily="18" charset="0"/>
-                    <a:cs typeface="Times New Roman" panose="02020603050405020304" pitchFamily="18" charset="0"/>
-                  </a:rPr>
-                  <a:t>: 		concentration of the ISTD in the ISTD mixture</a:t>
-                </a:r>
-                <a:endParaRPr lang="en-SG" sz="1260" dirty="0">
-                  <a:latin typeface="Times New Roman" panose="02020603050405020304" pitchFamily="18" charset="0"/>
-                  <a:cs typeface="Times New Roman" panose="02020603050405020304" pitchFamily="18" charset="0"/>
-                </a:endParaRPr>
-              </a:p>
-              <a:p>
-                <a:pPr marL="261930">
-                  <a:spcAft>
-                    <a:spcPts val="917"/>
-                  </a:spcAft>
-                </a:pPr>
-                <a:endParaRPr lang="en-SG" sz="1260" dirty="0">
-                  <a:latin typeface="Times New Roman" panose="02020603050405020304" pitchFamily="18" charset="0"/>
-                  <a:cs typeface="Times New Roman" panose="02020603050405020304" pitchFamily="18" charset="0"/>
-                </a:endParaRPr>
-              </a:p>
-              <a:p>
-                <a:pPr marL="261930">
-                  <a:spcAft>
-                    <a:spcPts val="917"/>
-                  </a:spcAft>
-                </a:pPr>
-                <a:endParaRPr lang="en-SG" sz="1260" dirty="0"/>
-              </a:p>
-            </p:txBody>
-          </p:sp>
-        </mc:Choice>
-        <mc:Fallback xmlns="">
-          <p:sp>
-            <p:nvSpPr>
-              <p:cNvPr id="16" name="TextBox 1">
-                <a:extLst>
-                  <a:ext uri="{FF2B5EF4-FFF2-40B4-BE49-F238E27FC236}">
-                    <a16:creationId xmlns:a16="http://schemas.microsoft.com/office/drawing/2014/main" id="{655DF021-091B-4217-9121-AABCB09C0498}"/>
-                  </a:ext>
-                </a:extLst>
-              </p:cNvPr>
-              <p:cNvSpPr txBox="1">
-                <a:spLocks noRot="1" noChangeAspect="1" noMove="1" noResize="1" noEditPoints="1" noAdjustHandles="1" noChangeArrowheads="1" noChangeShapeType="1" noTextEdit="1"/>
-              </p:cNvSpPr>
-              <p:nvPr/>
-            </p:nvSpPr>
-            <p:spPr>
-              <a:xfrm>
-                <a:off x="376615" y="1419578"/>
-                <a:ext cx="5920295" cy="3637849"/>
-              </a:xfrm>
-              <a:prstGeom prst="rect">
-                <a:avLst/>
-              </a:prstGeom>
-              <a:blipFill>
-                <a:blip r:embed="rId6"/>
-                <a:stretch>
-                  <a:fillRect t="-167"/>
-                </a:stretch>
-              </a:blipFill>
-              <a:ln w="9525" cmpd="sng">
-                <a:solidFill>
-                  <a:schemeClr val="lt1">
-                    <a:shade val="50000"/>
-                  </a:schemeClr>
-                </a:solidFill>
-              </a:ln>
-            </p:spPr>
-            <p:txBody>
-              <a:bodyPr/>
-              <a:lstStyle/>
-              <a:p>
-                <a:r>
-                  <a:rPr lang="en-SG">
-                    <a:noFill/>
-                  </a:rPr>
-                  <a:t> </a:t>
-                </a:r>
-              </a:p>
-            </p:txBody>
-          </p:sp>
-        </mc:Fallback>
-      </mc:AlternateContent>
       <p:pic>
         <p:nvPicPr>
           <p:cNvPr id="14" name="Picture 13">
@@ -12929,7 +12144,7 @@
           <p:nvPr/>
         </p:nvPicPr>
         <p:blipFill>
-          <a:blip r:embed="rId7"/>
+          <a:blip r:embed="rId5"/>
           <a:stretch>
             <a:fillRect/>
           </a:stretch>
@@ -12944,8 +12159,8 @@
           </a:prstGeom>
         </p:spPr>
       </p:pic>
-      <mc:AlternateContent xmlns:mc="http://schemas.openxmlformats.org/markup-compatibility/2006">
-        <mc:Choice xmlns:a14="http://schemas.microsoft.com/office/drawing/2010/main" Requires="a14">
+      <mc:AlternateContent xmlns:mc="http://schemas.openxmlformats.org/markup-compatibility/2006" xmlns:a14="http://schemas.microsoft.com/office/drawing/2010/main">
+        <mc:Choice Requires="a14">
           <p:sp>
             <p:nvSpPr>
               <p:cNvPr id="2" name="Rectangle 1">
@@ -13109,7 +12324,7 @@
             </p:txBody>
           </p:sp>
         </mc:Choice>
-        <mc:Fallback>
+        <mc:Fallback xmlns="">
           <p:sp>
             <p:nvSpPr>
               <p:cNvPr id="2" name="Rectangle 1">
@@ -13218,7 +12433,7 @@
           </a:ln>
           <a:extLst>
             <a:ext uri="{C572A759-6A51-4108-AA02-DFA0A04FC94B}">
-              <ma14:wrappingTextBoxFlag xmlns="" xmlns:ma14="http://schemas.microsoft.com/office/mac/drawingml/2011/main" val="1"/>
+              <ma14:wrappingTextBoxFlag xmlns:ma14="http://schemas.microsoft.com/office/mac/drawingml/2011/main" xmlns="" val="1"/>
             </a:ext>
           </a:extLst>
         </p:spPr>
@@ -13498,8 +12713,8 @@
           </a:p>
         </p:txBody>
       </p:sp>
-      <mc:AlternateContent xmlns:mc="http://schemas.openxmlformats.org/markup-compatibility/2006">
-        <mc:Choice xmlns:a14="http://schemas.microsoft.com/office/drawing/2010/main" Requires="a14">
+      <mc:AlternateContent xmlns:mc="http://schemas.openxmlformats.org/markup-compatibility/2006" xmlns:a14="http://schemas.microsoft.com/office/drawing/2010/main">
+        <mc:Choice Requires="a14">
           <p:sp>
             <p:nvSpPr>
               <p:cNvPr id="18" name="TextBox 17">
@@ -13710,7 +12925,7 @@
             </p:txBody>
           </p:sp>
         </mc:Choice>
-        <mc:Fallback>
+        <mc:Fallback xmlns="">
           <p:sp>
             <p:nvSpPr>
               <p:cNvPr id="18" name="TextBox 17">
@@ -13755,6 +12970,36 @@
           </p:sp>
         </mc:Fallback>
       </mc:AlternateContent>
+      <p:pic>
+        <p:nvPicPr>
+          <p:cNvPr id="3" name="Picture 2">
+            <a:extLst>
+              <a:ext uri="{FF2B5EF4-FFF2-40B4-BE49-F238E27FC236}">
+                <a16:creationId xmlns:a16="http://schemas.microsoft.com/office/drawing/2014/main" id="{E1C430C1-F46B-4314-8EFF-70E2FAF46F10}"/>
+              </a:ext>
+            </a:extLst>
+          </p:cNvPr>
+          <p:cNvPicPr>
+            <a:picLocks noChangeAspect="1"/>
+          </p:cNvPicPr>
+          <p:nvPr/>
+        </p:nvPicPr>
+        <p:blipFill>
+          <a:blip r:embed="rId10"/>
+          <a:stretch>
+            <a:fillRect/>
+          </a:stretch>
+        </p:blipFill>
+        <p:spPr>
+          <a:xfrm>
+            <a:off x="435807" y="1093710"/>
+            <a:ext cx="5862388" cy="3988090"/>
+          </a:xfrm>
+          <a:prstGeom prst="rect">
+            <a:avLst/>
+          </a:prstGeom>
+        </p:spPr>
+      </p:pic>
     </p:spTree>
     <p:extLst>
       <p:ext uri="{BB962C8B-B14F-4D97-AF65-F5344CB8AC3E}">
@@ -13785,8 +13030,8 @@
           <a:chExt cx="0" cy="0"/>
         </a:xfrm>
       </p:grpSpPr>
-      <mc:AlternateContent xmlns:mc="http://schemas.openxmlformats.org/markup-compatibility/2006">
-        <mc:Choice xmlns:a14="http://schemas.microsoft.com/office/drawing/2010/main" Requires="a14">
+      <mc:AlternateContent xmlns:mc="http://schemas.openxmlformats.org/markup-compatibility/2006" xmlns:a14="http://schemas.microsoft.com/office/drawing/2010/main">
+        <mc:Choice Requires="a14">
           <p:sp>
             <p:nvSpPr>
               <p:cNvPr id="4" name="TextBox 3">
@@ -14030,7 +13275,7 @@
             </p:txBody>
           </p:sp>
         </mc:Choice>
-        <mc:Fallback>
+        <mc:Fallback xmlns="">
           <p:sp>
             <p:nvSpPr>
               <p:cNvPr id="4" name="TextBox 3">
@@ -14442,8 +13687,8 @@
           <a:chExt cx="0" cy="0"/>
         </a:xfrm>
       </p:grpSpPr>
-      <mc:AlternateContent xmlns:mc="http://schemas.openxmlformats.org/markup-compatibility/2006">
-        <mc:Choice xmlns:a14="http://schemas.microsoft.com/office/drawing/2010/main" Requires="a14">
+      <mc:AlternateContent xmlns:mc="http://schemas.openxmlformats.org/markup-compatibility/2006" xmlns:a14="http://schemas.microsoft.com/office/drawing/2010/main">
+        <mc:Choice Requires="a14">
           <p:sp>
             <p:nvSpPr>
               <p:cNvPr id="5" name="TextBox 4">
@@ -14687,7 +13932,7 @@
             </p:txBody>
           </p:sp>
         </mc:Choice>
-        <mc:Fallback>
+        <mc:Fallback xmlns="">
           <p:sp>
             <p:nvSpPr>
               <p:cNvPr id="5" name="TextBox 4">
@@ -14732,8 +13977,8 @@
           </p:sp>
         </mc:Fallback>
       </mc:AlternateContent>
-      <mc:AlternateContent xmlns:mc="http://schemas.openxmlformats.org/markup-compatibility/2006">
-        <mc:Choice xmlns:a14="http://schemas.microsoft.com/office/drawing/2010/main" Requires="a14">
+      <mc:AlternateContent xmlns:mc="http://schemas.openxmlformats.org/markup-compatibility/2006" xmlns:a14="http://schemas.microsoft.com/office/drawing/2010/main">
+        <mc:Choice Requires="a14">
           <p:sp>
             <p:nvSpPr>
               <p:cNvPr id="6" name="TextBox 5">
@@ -14899,14 +14144,7 @@
                               <a:latin typeface="Cambria Math" panose="02040503050406030204" pitchFamily="18" charset="0"/>
                               <a:ea typeface="Cambria Math" panose="02040503050406030204" pitchFamily="18" charset="0"/>
                             </a:rPr>
-                            <m:t> ×</m:t>
-                          </m:r>
-                          <m:r>
-                            <a:rPr lang="en-SG" sz="4000" b="0" i="1">
-                              <a:latin typeface="Cambria Math" panose="02040503050406030204" pitchFamily="18" charset="0"/>
-                              <a:ea typeface="Cambria Math" panose="02040503050406030204" pitchFamily="18" charset="0"/>
-                            </a:rPr>
-                            <m:t>(0.0</m:t>
+                            <m:t> ×(0.0</m:t>
                           </m:r>
                           <m:r>
                             <a:rPr lang="en-SG" sz="4000" b="0" i="1" smtClean="0">
@@ -14920,14 +14158,7 @@
                               <a:latin typeface="Cambria Math" panose="02040503050406030204" pitchFamily="18" charset="0"/>
                               <a:ea typeface="Cambria Math" panose="02040503050406030204" pitchFamily="18" charset="0"/>
                             </a:rPr>
-                            <m:t>1</m:t>
-                          </m:r>
-                          <m:r>
-                            <a:rPr lang="en-SG" sz="4000" b="0" i="1">
-                              <a:latin typeface="Cambria Math" panose="02040503050406030204" pitchFamily="18" charset="0"/>
-                              <a:ea typeface="Cambria Math" panose="02040503050406030204" pitchFamily="18" charset="0"/>
-                            </a:rPr>
-                            <m:t> × </m:t>
+                            <m:t>1 × </m:t>
                           </m:r>
                           <m:sSub>
                             <m:sSubPr>
@@ -15011,7 +14242,7 @@
             </p:txBody>
           </p:sp>
         </mc:Choice>
-        <mc:Fallback>
+        <mc:Fallback xmlns="">
           <p:sp>
             <p:nvSpPr>
               <p:cNvPr id="6" name="TextBox 5">
@@ -15136,8 +14367,8 @@
           </a:p>
         </p:txBody>
       </p:sp>
-      <mc:AlternateContent xmlns:mc="http://schemas.openxmlformats.org/markup-compatibility/2006">
-        <mc:Choice xmlns:a14="http://schemas.microsoft.com/office/drawing/2010/main" Requires="a14">
+      <mc:AlternateContent xmlns:mc="http://schemas.openxmlformats.org/markup-compatibility/2006" xmlns:a14="http://schemas.microsoft.com/office/drawing/2010/main">
+        <mc:Choice Requires="a14">
           <p:sp>
             <p:nvSpPr>
               <p:cNvPr id="9" name="TextBox 8">
@@ -15331,7 +14562,7 @@
             </p:txBody>
           </p:sp>
         </mc:Choice>
-        <mc:Fallback>
+        <mc:Fallback xmlns="">
           <p:sp>
             <p:nvSpPr>
               <p:cNvPr id="9" name="TextBox 8">
@@ -15449,775 +14680,8 @@
           <a:chExt cx="0" cy="0"/>
         </a:xfrm>
       </p:grpSpPr>
-      <mc:AlternateContent xmlns:mc="http://schemas.openxmlformats.org/markup-compatibility/2006">
-        <mc:Choice xmlns:a14="http://schemas.microsoft.com/office/drawing/2010/main" Requires="a14">
-          <p:sp>
-            <p:nvSpPr>
-              <p:cNvPr id="6" name="TextBox 1">
-                <a:extLst>
-                  <a:ext uri="{FF2B5EF4-FFF2-40B4-BE49-F238E27FC236}">
-                    <a16:creationId xmlns:a16="http://schemas.microsoft.com/office/drawing/2014/main" id="{00000000-0008-0000-0200-000002000000}"/>
-                  </a:ext>
-                </a:extLst>
-              </p:cNvPr>
-              <p:cNvSpPr txBox="1"/>
-              <p:nvPr/>
-            </p:nvSpPr>
-            <p:spPr>
-              <a:xfrm>
-                <a:off x="1105958" y="3854879"/>
-                <a:ext cx="6166444" cy="3350618"/>
-              </a:xfrm>
-              <a:prstGeom prst="rect">
-                <a:avLst/>
-              </a:prstGeom>
-              <a:solidFill>
-                <a:schemeClr val="lt1"/>
-              </a:solidFill>
-              <a:ln w="9525" cmpd="sng">
-                <a:solidFill>
-                  <a:schemeClr val="lt1">
-                    <a:shade val="50000"/>
-                  </a:schemeClr>
-                </a:solidFill>
-              </a:ln>
-            </p:spPr>
-            <p:style>
-              <a:lnRef idx="0">
-                <a:scrgbClr r="0" g="0" b="0"/>
-              </a:lnRef>
-              <a:fillRef idx="0">
-                <a:scrgbClr r="0" g="0" b="0"/>
-              </a:fillRef>
-              <a:effectRef idx="0">
-                <a:scrgbClr r="0" g="0" b="0"/>
-              </a:effectRef>
-              <a:fontRef idx="minor">
-                <a:schemeClr val="dk1"/>
-              </a:fontRef>
-            </p:style>
-            <p:txBody>
-              <a:bodyPr wrap="square" rtlCol="0" anchor="t"/>
-              <a:lstStyle>
-                <a:lvl1pPr marL="0" indent="0">
-                  <a:defRPr sz="1100">
-                    <a:solidFill>
-                      <a:schemeClr val="dk1"/>
-                    </a:solidFill>
-                    <a:latin typeface="+mn-lt"/>
-                    <a:ea typeface="+mn-ea"/>
-                    <a:cs typeface="+mn-cs"/>
-                  </a:defRPr>
-                </a:lvl1pPr>
-                <a:lvl2pPr marL="457200" indent="0">
-                  <a:defRPr sz="1100">
-                    <a:solidFill>
-                      <a:schemeClr val="dk1"/>
-                    </a:solidFill>
-                    <a:latin typeface="+mn-lt"/>
-                    <a:ea typeface="+mn-ea"/>
-                    <a:cs typeface="+mn-cs"/>
-                  </a:defRPr>
-                </a:lvl2pPr>
-                <a:lvl3pPr marL="914400" indent="0">
-                  <a:defRPr sz="1100">
-                    <a:solidFill>
-                      <a:schemeClr val="dk1"/>
-                    </a:solidFill>
-                    <a:latin typeface="+mn-lt"/>
-                    <a:ea typeface="+mn-ea"/>
-                    <a:cs typeface="+mn-cs"/>
-                  </a:defRPr>
-                </a:lvl3pPr>
-                <a:lvl4pPr marL="1371600" indent="0">
-                  <a:defRPr sz="1100">
-                    <a:solidFill>
-                      <a:schemeClr val="dk1"/>
-                    </a:solidFill>
-                    <a:latin typeface="+mn-lt"/>
-                    <a:ea typeface="+mn-ea"/>
-                    <a:cs typeface="+mn-cs"/>
-                  </a:defRPr>
-                </a:lvl4pPr>
-                <a:lvl5pPr marL="1828800" indent="0">
-                  <a:defRPr sz="1100">
-                    <a:solidFill>
-                      <a:schemeClr val="dk1"/>
-                    </a:solidFill>
-                    <a:latin typeface="+mn-lt"/>
-                    <a:ea typeface="+mn-ea"/>
-                    <a:cs typeface="+mn-cs"/>
-                  </a:defRPr>
-                </a:lvl5pPr>
-                <a:lvl6pPr marL="2286000" indent="0">
-                  <a:defRPr sz="1100">
-                    <a:solidFill>
-                      <a:schemeClr val="dk1"/>
-                    </a:solidFill>
-                    <a:latin typeface="+mn-lt"/>
-                    <a:ea typeface="+mn-ea"/>
-                    <a:cs typeface="+mn-cs"/>
-                  </a:defRPr>
-                </a:lvl6pPr>
-                <a:lvl7pPr marL="2743200" indent="0">
-                  <a:defRPr sz="1100">
-                    <a:solidFill>
-                      <a:schemeClr val="dk1"/>
-                    </a:solidFill>
-                    <a:latin typeface="+mn-lt"/>
-                    <a:ea typeface="+mn-ea"/>
-                    <a:cs typeface="+mn-cs"/>
-                  </a:defRPr>
-                </a:lvl7pPr>
-                <a:lvl8pPr marL="3200400" indent="0">
-                  <a:defRPr sz="1100">
-                    <a:solidFill>
-                      <a:schemeClr val="dk1"/>
-                    </a:solidFill>
-                    <a:latin typeface="+mn-lt"/>
-                    <a:ea typeface="+mn-ea"/>
-                    <a:cs typeface="+mn-cs"/>
-                  </a:defRPr>
-                </a:lvl8pPr>
-                <a:lvl9pPr marL="3657600" indent="0">
-                  <a:defRPr sz="1100">
-                    <a:solidFill>
-                      <a:schemeClr val="dk1"/>
-                    </a:solidFill>
-                    <a:latin typeface="+mn-lt"/>
-                    <a:ea typeface="+mn-ea"/>
-                    <a:cs typeface="+mn-cs"/>
-                  </a:defRPr>
-                </a:lvl9pPr>
-              </a:lstStyle>
-              <a:p>
-                <a:pPr marL="261930">
-                  <a:spcAft>
-                    <a:spcPts val="917"/>
-                  </a:spcAft>
-                </a:pPr>
-                <a:r>
-                  <a:rPr lang="en-SG" sz="1375" dirty="0">
-                    <a:latin typeface="Times New Roman" panose="02020603050405020304" pitchFamily="18" charset="0"/>
-                    <a:ea typeface="Calibri" panose="020F0502020204030204" pitchFamily="34" charset="0"/>
-                    <a:cs typeface="Times New Roman" panose="02020603050405020304" pitchFamily="18" charset="0"/>
-                  </a:rPr>
-                  <a:t>Assuming the analyte and the selected ISTD have identical response factors, the concentration of an analyte in the sample can be calculated as</a:t>
-                </a:r>
-              </a:p>
-              <a:p>
-                <a:pPr marL="261930">
-                  <a:spcAft>
-                    <a:spcPts val="917"/>
-                  </a:spcAft>
-                </a:pPr>
-                <a14:m>
-                  <m:oMath xmlns:m="http://schemas.openxmlformats.org/officeDocument/2006/math">
-                    <m:sSub>
-                      <m:sSubPr>
-                        <m:ctrlPr>
-                          <a:rPr lang="en-SG" sz="1833" i="1">
-                            <a:latin typeface="Cambria Math" panose="02040503050406030204" pitchFamily="18" charset="0"/>
-                            <a:ea typeface="Calibri" panose="020F0502020204030204" pitchFamily="34" charset="0"/>
-                            <a:cs typeface="Times New Roman" panose="02020603050405020304" pitchFamily="18" charset="0"/>
-                          </a:rPr>
-                        </m:ctrlPr>
-                      </m:sSubPr>
-                      <m:e>
-                        <m:r>
-                          <a:rPr lang="en-US" sz="1833" i="1">
-                            <a:latin typeface="Cambria Math" panose="02040503050406030204" pitchFamily="18" charset="0"/>
-                            <a:ea typeface="Calibri" panose="020F0502020204030204" pitchFamily="34" charset="0"/>
-                            <a:cs typeface="Times New Roman" panose="02020603050405020304" pitchFamily="18" charset="0"/>
-                          </a:rPr>
-                          <m:t>𝑐</m:t>
-                        </m:r>
-                      </m:e>
-                      <m:sub>
-                        <m:r>
-                          <m:rPr>
-                            <m:sty m:val="p"/>
-                          </m:rPr>
-                          <a:rPr lang="en-US" sz="1833">
-                            <a:latin typeface="Cambria Math" panose="02040503050406030204" pitchFamily="18" charset="0"/>
-                            <a:ea typeface="Calibri" panose="020F0502020204030204" pitchFamily="34" charset="0"/>
-                            <a:cs typeface="Times New Roman" panose="02020603050405020304" pitchFamily="18" charset="0"/>
-                          </a:rPr>
-                          <m:t>Analyte</m:t>
-                        </m:r>
-                      </m:sub>
-                    </m:sSub>
-                    <m:r>
-                      <a:rPr lang="en-US" sz="1833">
-                        <a:latin typeface="Cambria Math" panose="02040503050406030204" pitchFamily="18" charset="0"/>
-                        <a:ea typeface="Calibri" panose="020F0502020204030204" pitchFamily="34" charset="0"/>
-                        <a:cs typeface="Times New Roman" panose="02020603050405020304" pitchFamily="18" charset="0"/>
-                      </a:rPr>
-                      <m:t>=</m:t>
-                    </m:r>
-                    <m:f>
-                      <m:fPr>
-                        <m:ctrlPr>
-                          <a:rPr lang="en-SG" sz="1833" i="1">
-                            <a:latin typeface="Cambria Math" panose="02040503050406030204" pitchFamily="18" charset="0"/>
-                            <a:ea typeface="DengXian"/>
-                            <a:cs typeface="Times New Roman" panose="02020603050405020304" pitchFamily="18" charset="0"/>
-                          </a:rPr>
-                        </m:ctrlPr>
-                      </m:fPr>
-                      <m:num>
-                        <m:sSub>
-                          <m:sSubPr>
-                            <m:ctrlPr>
-                              <a:rPr lang="en-SG" sz="1833" i="1">
-                                <a:latin typeface="Cambria Math" panose="02040503050406030204" pitchFamily="18" charset="0"/>
-                                <a:ea typeface="Calibri" panose="020F0502020204030204" pitchFamily="34" charset="0"/>
-                                <a:cs typeface="Times New Roman" panose="02020603050405020304" pitchFamily="18" charset="0"/>
-                              </a:rPr>
-                            </m:ctrlPr>
-                          </m:sSubPr>
-                          <m:e>
-                            <m:r>
-                              <a:rPr lang="en-US" sz="1833" i="1">
-                                <a:latin typeface="Cambria Math" panose="02040503050406030204" pitchFamily="18" charset="0"/>
-                                <a:ea typeface="Calibri" panose="020F0502020204030204" pitchFamily="34" charset="0"/>
-                                <a:cs typeface="Times New Roman" panose="02020603050405020304" pitchFamily="18" charset="0"/>
-                              </a:rPr>
-                              <m:t>𝐴𝑟𝑒𝑎</m:t>
-                            </m:r>
-                          </m:e>
-                          <m:sub>
-                            <m:r>
-                              <m:rPr>
-                                <m:sty m:val="p"/>
-                              </m:rPr>
-                              <a:rPr lang="en-US" sz="1833">
-                                <a:latin typeface="Cambria Math" panose="02040503050406030204" pitchFamily="18" charset="0"/>
-                                <a:ea typeface="Calibri" panose="020F0502020204030204" pitchFamily="34" charset="0"/>
-                                <a:cs typeface="Times New Roman" panose="02020603050405020304" pitchFamily="18" charset="0"/>
-                              </a:rPr>
-                              <m:t>Analyte</m:t>
-                            </m:r>
-                          </m:sub>
-                        </m:sSub>
-                      </m:num>
-                      <m:den>
-                        <m:sSub>
-                          <m:sSubPr>
-                            <m:ctrlPr>
-                              <a:rPr lang="en-SG" sz="1833" i="1">
-                                <a:latin typeface="Cambria Math" panose="02040503050406030204" pitchFamily="18" charset="0"/>
-                                <a:ea typeface="Calibri" panose="020F0502020204030204" pitchFamily="34" charset="0"/>
-                                <a:cs typeface="Times New Roman" panose="02020603050405020304" pitchFamily="18" charset="0"/>
-                              </a:rPr>
-                            </m:ctrlPr>
-                          </m:sSubPr>
-                          <m:e>
-                            <m:r>
-                              <a:rPr lang="en-US" sz="1833" i="1">
-                                <a:latin typeface="Cambria Math" panose="02040503050406030204" pitchFamily="18" charset="0"/>
-                                <a:ea typeface="Calibri" panose="020F0502020204030204" pitchFamily="34" charset="0"/>
-                                <a:cs typeface="Times New Roman" panose="02020603050405020304" pitchFamily="18" charset="0"/>
-                              </a:rPr>
-                              <m:t>𝐴𝑟𝑒𝑎</m:t>
-                            </m:r>
-                          </m:e>
-                          <m:sub>
-                            <m:r>
-                              <m:rPr>
-                                <m:sty m:val="p"/>
-                              </m:rPr>
-                              <a:rPr lang="en-US" sz="1833">
-                                <a:latin typeface="Cambria Math" panose="02040503050406030204" pitchFamily="18" charset="0"/>
-                                <a:ea typeface="Calibri" panose="020F0502020204030204" pitchFamily="34" charset="0"/>
-                                <a:cs typeface="Times New Roman" panose="02020603050405020304" pitchFamily="18" charset="0"/>
-                              </a:rPr>
-                              <m:t>ISTD</m:t>
-                            </m:r>
-                          </m:sub>
-                        </m:sSub>
-                      </m:den>
-                    </m:f>
-                    <m:r>
-                      <a:rPr lang="en-US" sz="1833">
-                        <a:latin typeface="Cambria Math" panose="02040503050406030204" pitchFamily="18" charset="0"/>
-                        <a:ea typeface="Calibri" panose="020F0502020204030204" pitchFamily="34" charset="0"/>
-                        <a:cs typeface="Times New Roman" panose="02020603050405020304" pitchFamily="18" charset="0"/>
-                      </a:rPr>
-                      <m:t>× </m:t>
-                    </m:r>
-                    <m:f>
-                      <m:fPr>
-                        <m:ctrlPr>
-                          <a:rPr lang="en-SG" sz="1833" i="1">
-                            <a:latin typeface="Cambria Math" panose="02040503050406030204" pitchFamily="18" charset="0"/>
-                            <a:ea typeface="Calibri" panose="020F0502020204030204" pitchFamily="34" charset="0"/>
-                            <a:cs typeface="Times New Roman" panose="02020603050405020304" pitchFamily="18" charset="0"/>
-                          </a:rPr>
-                        </m:ctrlPr>
-                      </m:fPr>
-                      <m:num>
-                        <m:sSub>
-                          <m:sSubPr>
-                            <m:ctrlPr>
-                              <a:rPr lang="en-SG" sz="1833" i="1">
-                                <a:latin typeface="Cambria Math" panose="02040503050406030204" pitchFamily="18" charset="0"/>
-                              </a:rPr>
-                            </m:ctrlPr>
-                          </m:sSubPr>
-                          <m:e>
-                            <m:r>
-                              <a:rPr lang="en-US" sz="1833" b="0" i="1">
-                                <a:latin typeface="Cambria Math" panose="02040503050406030204" pitchFamily="18" charset="0"/>
-                              </a:rPr>
-                              <m:t>𝑣</m:t>
-                            </m:r>
-                          </m:e>
-                          <m:sub>
-                            <m:r>
-                              <m:rPr>
-                                <m:sty m:val="p"/>
-                              </m:rPr>
-                              <a:rPr lang="en-US" sz="1833">
-                                <a:latin typeface="Cambria Math" panose="02040503050406030204" pitchFamily="18" charset="0"/>
-                              </a:rPr>
-                              <m:t>ISTD</m:t>
-                            </m:r>
-                          </m:sub>
-                        </m:sSub>
-                      </m:num>
-                      <m:den>
-                        <m:r>
-                          <a:rPr lang="en-US" sz="1833" b="0" i="1">
-                            <a:latin typeface="Cambria Math" panose="02040503050406030204" pitchFamily="18" charset="0"/>
-                            <a:ea typeface="Calibri" panose="020F0502020204030204" pitchFamily="34" charset="0"/>
-                            <a:cs typeface="Times New Roman" panose="02020603050405020304" pitchFamily="18" charset="0"/>
-                          </a:rPr>
-                          <m:t>𝑆𝑎𝑚𝑝𝑙𝑒</m:t>
-                        </m:r>
-                        <m:r>
-                          <a:rPr lang="en-US" sz="1833" b="0" i="1">
-                            <a:latin typeface="Cambria Math" panose="02040503050406030204" pitchFamily="18" charset="0"/>
-                            <a:ea typeface="Calibri" panose="020F0502020204030204" pitchFamily="34" charset="0"/>
-                            <a:cs typeface="Times New Roman" panose="02020603050405020304" pitchFamily="18" charset="0"/>
-                          </a:rPr>
-                          <m:t> </m:t>
-                        </m:r>
-                        <m:r>
-                          <a:rPr lang="en-US" sz="1833" b="0" i="1">
-                            <a:latin typeface="Cambria Math" panose="02040503050406030204" pitchFamily="18" charset="0"/>
-                            <a:ea typeface="Calibri" panose="020F0502020204030204" pitchFamily="34" charset="0"/>
-                            <a:cs typeface="Times New Roman" panose="02020603050405020304" pitchFamily="18" charset="0"/>
-                          </a:rPr>
-                          <m:t>𝐴𝑚𝑜𝑢𝑛𝑡</m:t>
-                        </m:r>
-                        <m:r>
-                          <a:rPr lang="en-US" sz="1833" b="0" i="1">
-                            <a:latin typeface="Cambria Math" panose="02040503050406030204" pitchFamily="18" charset="0"/>
-                            <a:ea typeface="Calibri" panose="020F0502020204030204" pitchFamily="34" charset="0"/>
-                            <a:cs typeface="Times New Roman" panose="02020603050405020304" pitchFamily="18" charset="0"/>
-                          </a:rPr>
-                          <m:t> </m:t>
-                        </m:r>
-                      </m:den>
-                    </m:f>
-                    <m:r>
-                      <a:rPr lang="en-US" sz="1833" b="0">
-                        <a:latin typeface="Cambria Math" panose="02040503050406030204" pitchFamily="18" charset="0"/>
-                      </a:rPr>
-                      <m:t> </m:t>
-                    </m:r>
-                    <m:r>
-                      <a:rPr lang="en-US" sz="1604" b="0">
-                        <a:latin typeface="Cambria Math" panose="02040503050406030204" pitchFamily="18" charset="0"/>
-                      </a:rPr>
-                      <m:t> </m:t>
-                    </m:r>
-                    <m:r>
-                      <a:rPr lang="en-US" sz="1604">
-                        <a:latin typeface="Cambria Math" panose="02040503050406030204" pitchFamily="18" charset="0"/>
-                      </a:rPr>
-                      <m:t>×</m:t>
-                    </m:r>
-                    <m:sSub>
-                      <m:sSubPr>
-                        <m:ctrlPr>
-                          <a:rPr lang="en-US" sz="1604" b="0" i="1">
-                            <a:latin typeface="Cambria Math" panose="02040503050406030204" pitchFamily="18" charset="0"/>
-                          </a:rPr>
-                        </m:ctrlPr>
-                      </m:sSubPr>
-                      <m:e>
-                        <m:r>
-                          <a:rPr lang="en-US" sz="1604" b="0" i="1">
-                            <a:latin typeface="Cambria Math" panose="02040503050406030204" pitchFamily="18" charset="0"/>
-                          </a:rPr>
-                          <m:t>𝑐</m:t>
-                        </m:r>
-                      </m:e>
-                      <m:sub>
-                        <m:r>
-                          <a:rPr lang="en-US" sz="1604" b="0" i="1">
-                            <a:latin typeface="Cambria Math" panose="02040503050406030204" pitchFamily="18" charset="0"/>
-                          </a:rPr>
-                          <m:t>𝐼𝑆𝑇𝐷</m:t>
-                        </m:r>
-                      </m:sub>
-                    </m:sSub>
-                    <m:r>
-                      <a:rPr lang="en-US" sz="1833" b="0" i="1">
-                        <a:latin typeface="Cambria Math" panose="02040503050406030204" pitchFamily="18" charset="0"/>
-                        <a:ea typeface="Calibri" panose="020F0502020204030204" pitchFamily="34" charset="0"/>
-                        <a:cs typeface="Times New Roman" panose="02020603050405020304" pitchFamily="18" charset="0"/>
-                      </a:rPr>
-                      <m:t> </m:t>
-                    </m:r>
-                  </m:oMath>
-                </a14:m>
-                <a:r>
-                  <a:rPr lang="en-US" sz="1375" i="1" dirty="0">
-                    <a:ea typeface="Calibri" panose="020F0502020204030204" pitchFamily="34" charset="0"/>
-                    <a:cs typeface="Times New Roman" panose="02020603050405020304" pitchFamily="18" charset="0"/>
-                  </a:rPr>
-                  <a:t>   </a:t>
-                </a:r>
-              </a:p>
-              <a:p>
-                <a:pPr marL="261930">
-                  <a:spcAft>
-                    <a:spcPts val="917"/>
-                  </a:spcAft>
-                </a:pPr>
-                <a:r>
-                  <a:rPr lang="en-US" sz="1260" dirty="0">
-                    <a:latin typeface="Times New Roman" panose="02020603050405020304" pitchFamily="18" charset="0"/>
-                    <a:ea typeface="Calibri" panose="020F0502020204030204" pitchFamily="34" charset="0"/>
-                  </a:rPr>
-                  <a:t>where</a:t>
-                </a:r>
-              </a:p>
-              <a:p>
-                <a:pPr marL="261930">
-                  <a:spcAft>
-                    <a:spcPts val="917"/>
-                  </a:spcAft>
-                </a:pPr>
-                <a:r>
-                  <a:rPr lang="en-US" sz="1260" i="1" dirty="0" err="1">
-                    <a:latin typeface="Times New Roman" panose="02020603050405020304" pitchFamily="18" charset="0"/>
-                    <a:ea typeface="Calibri" panose="020F0502020204030204" pitchFamily="34" charset="0"/>
-                  </a:rPr>
-                  <a:t>c</a:t>
-                </a:r>
-                <a:r>
-                  <a:rPr lang="en-US" sz="1260" i="1" baseline="-25000" dirty="0" err="1">
-                    <a:latin typeface="Times New Roman" panose="02020603050405020304" pitchFamily="18" charset="0"/>
-                    <a:ea typeface="Calibri" panose="020F0502020204030204" pitchFamily="34" charset="0"/>
-                  </a:rPr>
-                  <a:t>Analyte</a:t>
-                </a:r>
-                <a:r>
-                  <a:rPr lang="en-US" sz="1260" dirty="0">
-                    <a:latin typeface="Times New Roman" panose="02020603050405020304" pitchFamily="18" charset="0"/>
-                    <a:ea typeface="Calibri" panose="020F0502020204030204" pitchFamily="34" charset="0"/>
-                  </a:rPr>
-                  <a:t>: 		molar concentration of the analyte in the sample</a:t>
-                </a:r>
-                <a:endParaRPr lang="en-US" sz="1260" i="1" dirty="0">
-                  <a:latin typeface="Times New Roman" panose="02020603050405020304" pitchFamily="18" charset="0"/>
-                  <a:ea typeface="Calibri" panose="020F0502020204030204" pitchFamily="34" charset="0"/>
-                </a:endParaRPr>
-              </a:p>
-              <a:p>
-                <a:pPr marL="261930" defTabSz="1047720" hangingPunct="1">
-                  <a:spcBef>
-                    <a:spcPts val="0"/>
-                  </a:spcBef>
-                  <a:spcAft>
-                    <a:spcPts val="917"/>
-                  </a:spcAft>
-                  <a:defRPr/>
-                </a:pPr>
-                <a:r>
-                  <a:rPr lang="en-US" sz="1260" i="1" dirty="0" err="1">
-                    <a:latin typeface="Times New Roman" panose="02020603050405020304" pitchFamily="18" charset="0"/>
-                    <a:cs typeface="Times New Roman" panose="02020603050405020304" pitchFamily="18" charset="0"/>
-                  </a:rPr>
-                  <a:t>Area</a:t>
-                </a:r>
-                <a:r>
-                  <a:rPr lang="en-US" sz="1260" i="1" baseline="-25000" dirty="0" err="1">
-                    <a:latin typeface="Times New Roman" panose="02020603050405020304" pitchFamily="18" charset="0"/>
-                    <a:cs typeface="Times New Roman" panose="02020603050405020304" pitchFamily="18" charset="0"/>
-                  </a:rPr>
-                  <a:t>Analyte</a:t>
-                </a:r>
-                <a:r>
-                  <a:rPr lang="en-US" sz="1260" dirty="0">
-                    <a:latin typeface="Times New Roman" panose="02020603050405020304" pitchFamily="18" charset="0"/>
-                    <a:cs typeface="Times New Roman" panose="02020603050405020304" pitchFamily="18" charset="0"/>
-                  </a:rPr>
-                  <a:t>:</a:t>
-                </a:r>
-                <a:r>
-                  <a:rPr lang="en-US" sz="1260" i="1" dirty="0">
-                    <a:latin typeface="Times New Roman" panose="02020603050405020304" pitchFamily="18" charset="0"/>
-                    <a:cs typeface="Times New Roman" panose="02020603050405020304" pitchFamily="18" charset="0"/>
-                  </a:rPr>
-                  <a:t> 		</a:t>
-                </a:r>
-                <a:r>
-                  <a:rPr lang="en-US" sz="1260" dirty="0">
-                    <a:latin typeface="Times New Roman" panose="02020603050405020304" pitchFamily="18" charset="0"/>
-                    <a:cs typeface="Times New Roman" panose="02020603050405020304" pitchFamily="18" charset="0"/>
-                  </a:rPr>
-                  <a:t>peak area of analyte,</a:t>
-                </a:r>
-                <a:r>
-                  <a:rPr lang="en-US" sz="1260" i="1" dirty="0">
-                    <a:latin typeface="Times New Roman" panose="02020603050405020304" pitchFamily="18" charset="0"/>
-                    <a:cs typeface="Times New Roman" panose="02020603050405020304" pitchFamily="18" charset="0"/>
-                  </a:rPr>
-                  <a:t>  </a:t>
-                </a:r>
-              </a:p>
-              <a:p>
-                <a:pPr marL="261930" defTabSz="1047720" hangingPunct="1">
-                  <a:spcBef>
-                    <a:spcPts val="0"/>
-                  </a:spcBef>
-                  <a:spcAft>
-                    <a:spcPts val="917"/>
-                  </a:spcAft>
-                  <a:defRPr/>
-                </a:pPr>
-                <a:r>
-                  <a:rPr lang="en-US" sz="1260" i="1" dirty="0" err="1">
-                    <a:latin typeface="Times New Roman" panose="02020603050405020304" pitchFamily="18" charset="0"/>
-                    <a:cs typeface="Times New Roman" panose="02020603050405020304" pitchFamily="18" charset="0"/>
-                  </a:rPr>
-                  <a:t>Area</a:t>
-                </a:r>
-                <a:r>
-                  <a:rPr lang="en-US" sz="1260" i="1" baseline="-25000" dirty="0" err="1">
-                    <a:latin typeface="Times New Roman" panose="02020603050405020304" pitchFamily="18" charset="0"/>
-                    <a:cs typeface="Times New Roman" panose="02020603050405020304" pitchFamily="18" charset="0"/>
-                  </a:rPr>
-                  <a:t>ISTD</a:t>
-                </a:r>
-                <a:r>
-                  <a:rPr lang="en-US" sz="1260" dirty="0">
-                    <a:latin typeface="Times New Roman" panose="02020603050405020304" pitchFamily="18" charset="0"/>
-                    <a:cs typeface="Times New Roman" panose="02020603050405020304" pitchFamily="18" charset="0"/>
-                  </a:rPr>
-                  <a:t>:</a:t>
-                </a:r>
-                <a:r>
-                  <a:rPr lang="en-US" sz="1260" i="1" dirty="0">
-                    <a:latin typeface="Times New Roman" panose="02020603050405020304" pitchFamily="18" charset="0"/>
-                    <a:cs typeface="Times New Roman" panose="02020603050405020304" pitchFamily="18" charset="0"/>
-                  </a:rPr>
-                  <a:t> 		</a:t>
-                </a:r>
-                <a:r>
-                  <a:rPr lang="en-US" sz="1260" dirty="0">
-                    <a:latin typeface="Times New Roman" panose="02020603050405020304" pitchFamily="18" charset="0"/>
-                    <a:cs typeface="Times New Roman" panose="02020603050405020304" pitchFamily="18" charset="0"/>
-                  </a:rPr>
-                  <a:t>peak area of ISTD,</a:t>
-                </a:r>
-              </a:p>
-              <a:p>
-                <a:pPr marL="261930">
-                  <a:spcAft>
-                    <a:spcPts val="917"/>
-                  </a:spcAft>
-                </a:pPr>
-                <a:r>
-                  <a:rPr lang="en-US" sz="1260" i="1" dirty="0" err="1">
-                    <a:latin typeface="Times New Roman" panose="02020603050405020304" pitchFamily="18" charset="0"/>
-                    <a:cs typeface="Times New Roman" panose="02020603050405020304" pitchFamily="18" charset="0"/>
-                  </a:rPr>
-                  <a:t>v</a:t>
-                </a:r>
-                <a:r>
-                  <a:rPr lang="en-US" sz="1260" i="1" baseline="-25000" dirty="0" err="1">
-                    <a:latin typeface="Times New Roman" panose="02020603050405020304" pitchFamily="18" charset="0"/>
-                    <a:cs typeface="Times New Roman" panose="02020603050405020304" pitchFamily="18" charset="0"/>
-                  </a:rPr>
-                  <a:t>ISTD</a:t>
-                </a:r>
-                <a:r>
-                  <a:rPr lang="en-US" sz="1260" dirty="0">
-                    <a:latin typeface="Times New Roman" panose="02020603050405020304" pitchFamily="18" charset="0"/>
-                    <a:cs typeface="Times New Roman" panose="02020603050405020304" pitchFamily="18" charset="0"/>
-                  </a:rPr>
-                  <a:t>:</a:t>
-                </a:r>
-                <a:r>
-                  <a:rPr lang="en-US" sz="1260" dirty="0"/>
-                  <a:t> 		</a:t>
-                </a:r>
-                <a:r>
-                  <a:rPr lang="en-US" sz="1260" dirty="0">
-                    <a:latin typeface="Times New Roman" panose="02020603050405020304" pitchFamily="18" charset="0"/>
-                    <a:cs typeface="Times New Roman" panose="02020603050405020304" pitchFamily="18" charset="0"/>
-                  </a:rPr>
-                  <a:t>extracted</a:t>
-                </a:r>
-                <a:r>
-                  <a:rPr lang="en-US" sz="1260" dirty="0"/>
-                  <a:t> </a:t>
-                </a:r>
-                <a:r>
-                  <a:rPr lang="en-US" sz="1260" dirty="0">
-                    <a:latin typeface="Times New Roman" panose="02020603050405020304" pitchFamily="18" charset="0"/>
-                    <a:cs typeface="Times New Roman" panose="02020603050405020304" pitchFamily="18" charset="0"/>
-                  </a:rPr>
-                  <a:t>volume from the ISTD mixture,</a:t>
-                </a:r>
-              </a:p>
-              <a:p>
-                <a:pPr marL="261930" defTabSz="1047720" hangingPunct="1">
-                  <a:spcBef>
-                    <a:spcPts val="0"/>
-                  </a:spcBef>
-                  <a:spcAft>
-                    <a:spcPts val="917"/>
-                  </a:spcAft>
-                  <a:defRPr/>
-                </a:pPr>
-                <a:r>
-                  <a:rPr lang="en-US" sz="1260" i="1" dirty="0" err="1">
-                    <a:latin typeface="Times New Roman" panose="02020603050405020304" pitchFamily="18" charset="0"/>
-                    <a:cs typeface="Times New Roman" panose="02020603050405020304" pitchFamily="18" charset="0"/>
-                  </a:rPr>
-                  <a:t>Sample_Amount</a:t>
-                </a:r>
-                <a:r>
-                  <a:rPr lang="en-US" sz="1260" dirty="0">
-                    <a:latin typeface="Times New Roman" panose="02020603050405020304" pitchFamily="18" charset="0"/>
-                    <a:cs typeface="Times New Roman" panose="02020603050405020304" pitchFamily="18" charset="0"/>
-                  </a:rPr>
-                  <a:t>: 	quantity of the sample, </a:t>
-                </a:r>
-                <a:endParaRPr lang="en-SG" sz="1260" dirty="0">
-                  <a:latin typeface="Times New Roman" panose="02020603050405020304" pitchFamily="18" charset="0"/>
-                  <a:cs typeface="Times New Roman" panose="02020603050405020304" pitchFamily="18" charset="0"/>
-                </a:endParaRPr>
-              </a:p>
-              <a:p>
-                <a:pPr marL="261930" defTabSz="1047720" hangingPunct="1">
-                  <a:spcBef>
-                    <a:spcPts val="0"/>
-                  </a:spcBef>
-                  <a:spcAft>
-                    <a:spcPts val="917"/>
-                  </a:spcAft>
-                  <a:defRPr/>
-                </a:pPr>
-                <a:r>
-                  <a:rPr lang="en-US" sz="1260" i="1" dirty="0" err="1">
-                    <a:latin typeface="Times New Roman" panose="02020603050405020304" pitchFamily="18" charset="0"/>
-                    <a:cs typeface="Times New Roman" panose="02020603050405020304" pitchFamily="18" charset="0"/>
-                  </a:rPr>
-                  <a:t>c</a:t>
-                </a:r>
-                <a:r>
-                  <a:rPr lang="en-US" sz="1260" i="1" baseline="-25000" dirty="0" err="1">
-                    <a:latin typeface="Times New Roman" panose="02020603050405020304" pitchFamily="18" charset="0"/>
-                    <a:cs typeface="Times New Roman" panose="02020603050405020304" pitchFamily="18" charset="0"/>
-                  </a:rPr>
-                  <a:t>ISTD</a:t>
-                </a:r>
-                <a:r>
-                  <a:rPr lang="en-US" sz="1260" dirty="0">
-                    <a:latin typeface="Times New Roman" panose="02020603050405020304" pitchFamily="18" charset="0"/>
-                    <a:cs typeface="Times New Roman" panose="02020603050405020304" pitchFamily="18" charset="0"/>
-                  </a:rPr>
-                  <a:t>: 		concentration of the ISTD in the ISTD mixture</a:t>
-                </a:r>
-                <a:endParaRPr lang="en-SG" sz="1260" dirty="0">
-                  <a:latin typeface="Times New Roman" panose="02020603050405020304" pitchFamily="18" charset="0"/>
-                  <a:cs typeface="Times New Roman" panose="02020603050405020304" pitchFamily="18" charset="0"/>
-                </a:endParaRPr>
-              </a:p>
-              <a:p>
-                <a:pPr marL="261930">
-                  <a:spcAft>
-                    <a:spcPts val="917"/>
-                  </a:spcAft>
-                </a:pPr>
-                <a:endParaRPr lang="en-SG" sz="1260" dirty="0">
-                  <a:latin typeface="Times New Roman" panose="02020603050405020304" pitchFamily="18" charset="0"/>
-                  <a:cs typeface="Times New Roman" panose="02020603050405020304" pitchFamily="18" charset="0"/>
-                </a:endParaRPr>
-              </a:p>
-              <a:p>
-                <a:pPr marL="261930">
-                  <a:spcAft>
-                    <a:spcPts val="917"/>
-                  </a:spcAft>
-                </a:pPr>
-                <a:endParaRPr lang="en-SG" sz="1260" dirty="0"/>
-              </a:p>
-            </p:txBody>
-          </p:sp>
-        </mc:Choice>
-        <mc:Fallback>
-          <p:sp>
-            <p:nvSpPr>
-              <p:cNvPr id="6" name="TextBox 1">
-                <a:extLst>
-                  <a:ext uri="{FF2B5EF4-FFF2-40B4-BE49-F238E27FC236}">
-                    <a16:creationId xmlns:a16="http://schemas.microsoft.com/office/drawing/2014/main" id="{00000000-0008-0000-0200-000002000000}"/>
-                  </a:ext>
-                </a:extLst>
-              </p:cNvPr>
-              <p:cNvSpPr txBox="1">
-                <a:spLocks noRot="1" noChangeAspect="1" noMove="1" noResize="1" noEditPoints="1" noAdjustHandles="1" noChangeArrowheads="1" noChangeShapeType="1" noTextEdit="1"/>
-              </p:cNvSpPr>
-              <p:nvPr/>
-            </p:nvSpPr>
-            <p:spPr>
-              <a:xfrm>
-                <a:off x="1105958" y="3854879"/>
-                <a:ext cx="6166444" cy="3350618"/>
-              </a:xfrm>
-              <a:prstGeom prst="rect">
-                <a:avLst/>
-              </a:prstGeom>
-              <a:blipFill>
-                <a:blip r:embed="rId2"/>
-                <a:stretch>
-                  <a:fillRect b="-543"/>
-                </a:stretch>
-              </a:blipFill>
-              <a:ln w="9525" cmpd="sng">
-                <a:solidFill>
-                  <a:schemeClr val="lt1">
-                    <a:shade val="50000"/>
-                  </a:schemeClr>
-                </a:solidFill>
-              </a:ln>
-            </p:spPr>
-            <p:txBody>
-              <a:bodyPr/>
-              <a:lstStyle/>
-              <a:p>
-                <a:r>
-                  <a:rPr lang="en-SG">
-                    <a:noFill/>
-                  </a:rPr>
-                  <a:t> </a:t>
-                </a:r>
-              </a:p>
-            </p:txBody>
-          </p:sp>
-        </mc:Fallback>
-      </mc:AlternateContent>
-      <mc:AlternateContent xmlns:mc="http://schemas.openxmlformats.org/markup-compatibility/2006">
-        <mc:Choice xmlns:a14="http://schemas.microsoft.com/office/drawing/2010/main" Requires="a14">
+      <mc:AlternateContent xmlns:mc="http://schemas.openxmlformats.org/markup-compatibility/2006" xmlns:a14="http://schemas.microsoft.com/office/drawing/2010/main">
+        <mc:Choice Requires="a14">
           <p:sp>
             <p:nvSpPr>
               <p:cNvPr id="9" name="TextBox 8">
@@ -16424,7 +14888,7 @@
             </p:txBody>
           </p:sp>
         </mc:Choice>
-        <mc:Fallback>
+        <mc:Fallback xmlns="">
           <p:sp>
             <p:nvSpPr>
               <p:cNvPr id="9" name="TextBox 8">
@@ -16506,8 +14970,8 @@
           </a:p>
         </p:txBody>
       </p:sp>
-      <mc:AlternateContent xmlns:mc="http://schemas.openxmlformats.org/markup-compatibility/2006">
-        <mc:Choice xmlns:a14="http://schemas.microsoft.com/office/drawing/2010/main" Requires="a14">
+      <mc:AlternateContent xmlns:mc="http://schemas.openxmlformats.org/markup-compatibility/2006" xmlns:a14="http://schemas.microsoft.com/office/drawing/2010/main">
+        <mc:Choice Requires="a14">
           <p:sp>
             <p:nvSpPr>
               <p:cNvPr id="7" name="TextBox 6">
@@ -16701,7 +15165,7 @@
             </p:txBody>
           </p:sp>
         </mc:Choice>
-        <mc:Fallback>
+        <mc:Fallback xmlns="">
           <p:sp>
             <p:nvSpPr>
               <p:cNvPr id="7" name="TextBox 6">
@@ -16746,6 +15210,36 @@
           </p:sp>
         </mc:Fallback>
       </mc:AlternateContent>
+      <p:pic>
+        <p:nvPicPr>
+          <p:cNvPr id="2" name="Picture 1">
+            <a:extLst>
+              <a:ext uri="{FF2B5EF4-FFF2-40B4-BE49-F238E27FC236}">
+                <a16:creationId xmlns:a16="http://schemas.microsoft.com/office/drawing/2014/main" id="{D224096E-746C-4150-9059-D570EABCE347}"/>
+              </a:ext>
+            </a:extLst>
+          </p:cNvPr>
+          <p:cNvPicPr>
+            <a:picLocks noChangeAspect="1"/>
+          </p:cNvPicPr>
+          <p:nvPr/>
+        </p:nvPicPr>
+        <p:blipFill>
+          <a:blip r:embed="rId5"/>
+          <a:stretch>
+            <a:fillRect/>
+          </a:stretch>
+        </p:blipFill>
+        <p:spPr>
+          <a:xfrm>
+            <a:off x="628055" y="3421795"/>
+            <a:ext cx="6668484" cy="4536464"/>
+          </a:xfrm>
+          <a:prstGeom prst="rect">
+            <a:avLst/>
+          </a:prstGeom>
+        </p:spPr>
+      </p:pic>
     </p:spTree>
     <p:extLst>
       <p:ext uri="{BB962C8B-B14F-4D97-AF65-F5344CB8AC3E}">

</xml_diff>